<commit_message>
add ERP CRM relationship
</commit_message>
<xml_diff>
--- a/Jerry.pptx
+++ b/Jerry.pptx
@@ -5,7 +5,7 @@
     <p:sldMasterId id="2147483648" r:id="rId1"/>
   </p:sldMasterIdLst>
   <p:notesMasterIdLst>
-    <p:notesMasterId r:id="rId28"/>
+    <p:notesMasterId r:id="rId29"/>
   </p:notesMasterIdLst>
   <p:sldIdLst>
     <p:sldId id="257" r:id="rId2"/>
@@ -34,6 +34,7 @@
     <p:sldId id="283" r:id="rId25"/>
     <p:sldId id="284" r:id="rId26"/>
     <p:sldId id="285" r:id="rId27"/>
+    <p:sldId id="286" r:id="rId28"/>
   </p:sldIdLst>
   <p:sldSz cx="12192000" cy="6858000"/>
   <p:notesSz cx="6858000" cy="9144000"/>
@@ -222,7 +223,7 @@
           <a:p>
             <a:fld id="{C1FFF932-AE32-4CB2-A004-ABC55BBBB993}" type="datetimeFigureOut">
               <a:rPr lang="en-US" smtClean="0"/>
-              <a:t>2016-05-03</a:t>
+              <a:t>2016-05-05</a:t>
             </a:fld>
             <a:endParaRPr lang="en-US"/>
           </a:p>
@@ -2259,7 +2260,7 @@
           <a:p>
             <a:fld id="{32885C6E-53D4-4DF2-B9C6-C242624B2A8A}" type="datetimeFigureOut">
               <a:rPr lang="en-US" smtClean="0"/>
-              <a:t>2016-05-03</a:t>
+              <a:t>2016-05-05</a:t>
             </a:fld>
             <a:endParaRPr lang="en-US"/>
           </a:p>
@@ -2429,7 +2430,7 @@
           <a:p>
             <a:fld id="{32885C6E-53D4-4DF2-B9C6-C242624B2A8A}" type="datetimeFigureOut">
               <a:rPr lang="en-US" smtClean="0"/>
-              <a:t>2016-05-03</a:t>
+              <a:t>2016-05-05</a:t>
             </a:fld>
             <a:endParaRPr lang="en-US"/>
           </a:p>
@@ -2609,7 +2610,7 @@
           <a:p>
             <a:fld id="{32885C6E-53D4-4DF2-B9C6-C242624B2A8A}" type="datetimeFigureOut">
               <a:rPr lang="en-US" smtClean="0"/>
-              <a:t>2016-05-03</a:t>
+              <a:t>2016-05-05</a:t>
             </a:fld>
             <a:endParaRPr lang="en-US"/>
           </a:p>
@@ -2779,7 +2780,7 @@
           <a:p>
             <a:fld id="{32885C6E-53D4-4DF2-B9C6-C242624B2A8A}" type="datetimeFigureOut">
               <a:rPr lang="en-US" smtClean="0"/>
-              <a:t>2016-05-03</a:t>
+              <a:t>2016-05-05</a:t>
             </a:fld>
             <a:endParaRPr lang="en-US"/>
           </a:p>
@@ -3025,7 +3026,7 @@
           <a:p>
             <a:fld id="{32885C6E-53D4-4DF2-B9C6-C242624B2A8A}" type="datetimeFigureOut">
               <a:rPr lang="en-US" smtClean="0"/>
-              <a:t>2016-05-03</a:t>
+              <a:t>2016-05-05</a:t>
             </a:fld>
             <a:endParaRPr lang="en-US"/>
           </a:p>
@@ -3257,7 +3258,7 @@
           <a:p>
             <a:fld id="{32885C6E-53D4-4DF2-B9C6-C242624B2A8A}" type="datetimeFigureOut">
               <a:rPr lang="en-US" smtClean="0"/>
-              <a:t>2016-05-03</a:t>
+              <a:t>2016-05-05</a:t>
             </a:fld>
             <a:endParaRPr lang="en-US"/>
           </a:p>
@@ -3624,7 +3625,7 @@
           <a:p>
             <a:fld id="{32885C6E-53D4-4DF2-B9C6-C242624B2A8A}" type="datetimeFigureOut">
               <a:rPr lang="en-US" smtClean="0"/>
-              <a:t>2016-05-03</a:t>
+              <a:t>2016-05-05</a:t>
             </a:fld>
             <a:endParaRPr lang="en-US"/>
           </a:p>
@@ -3742,7 +3743,7 @@
           <a:p>
             <a:fld id="{32885C6E-53D4-4DF2-B9C6-C242624B2A8A}" type="datetimeFigureOut">
               <a:rPr lang="en-US" smtClean="0"/>
-              <a:t>2016-05-03</a:t>
+              <a:t>2016-05-05</a:t>
             </a:fld>
             <a:endParaRPr lang="en-US"/>
           </a:p>
@@ -3837,7 +3838,7 @@
           <a:p>
             <a:fld id="{32885C6E-53D4-4DF2-B9C6-C242624B2A8A}" type="datetimeFigureOut">
               <a:rPr lang="en-US" smtClean="0"/>
-              <a:t>2016-05-03</a:t>
+              <a:t>2016-05-05</a:t>
             </a:fld>
             <a:endParaRPr lang="en-US"/>
           </a:p>
@@ -4114,7 +4115,7 @@
           <a:p>
             <a:fld id="{32885C6E-53D4-4DF2-B9C6-C242624B2A8A}" type="datetimeFigureOut">
               <a:rPr lang="en-US" smtClean="0"/>
-              <a:t>2016-05-03</a:t>
+              <a:t>2016-05-05</a:t>
             </a:fld>
             <a:endParaRPr lang="en-US"/>
           </a:p>
@@ -4367,7 +4368,7 @@
           <a:p>
             <a:fld id="{32885C6E-53D4-4DF2-B9C6-C242624B2A8A}" type="datetimeFigureOut">
               <a:rPr lang="en-US" smtClean="0"/>
-              <a:t>2016-05-03</a:t>
+              <a:t>2016-05-05</a:t>
             </a:fld>
             <a:endParaRPr lang="en-US"/>
           </a:p>
@@ -4580,7 +4581,7 @@
           <a:p>
             <a:fld id="{32885C6E-53D4-4DF2-B9C6-C242624B2A8A}" type="datetimeFigureOut">
               <a:rPr lang="en-US" smtClean="0"/>
-              <a:t>2016-05-03</a:t>
+              <a:t>2016-05-05</a:t>
             </a:fld>
             <a:endParaRPr lang="en-US"/>
           </a:p>
@@ -14243,6 +14244,639 @@
     <p:extLst>
       <p:ext uri="{BB962C8B-B14F-4D97-AF65-F5344CB8AC3E}">
         <p14:creationId xmlns:p14="http://schemas.microsoft.com/office/powerpoint/2010/main" val="1631724625"/>
+      </p:ext>
+    </p:extLst>
+  </p:cSld>
+  <p:clrMapOvr>
+    <a:masterClrMapping/>
+  </p:clrMapOvr>
+</p:sld>
+</file>
+
+<file path=ppt/slides/slide27.xml><?xml version="1.0" encoding="utf-8"?>
+<p:sld xmlns:a="http://schemas.openxmlformats.org/drawingml/2006/main" xmlns:r="http://schemas.openxmlformats.org/officeDocument/2006/relationships" xmlns:p="http://schemas.openxmlformats.org/presentationml/2006/main">
+  <p:cSld>
+    <p:spTree>
+      <p:nvGrpSpPr>
+        <p:cNvPr id="1" name=""/>
+        <p:cNvGrpSpPr/>
+        <p:nvPr/>
+      </p:nvGrpSpPr>
+      <p:grpSpPr>
+        <a:xfrm>
+          <a:off x="0" y="0"/>
+          <a:ext cx="0" cy="0"/>
+          <a:chOff x="0" y="0"/>
+          <a:chExt cx="0" cy="0"/>
+        </a:xfrm>
+      </p:grpSpPr>
+      <p:sp>
+        <p:nvSpPr>
+          <p:cNvPr id="3" name="Rectangle 2"/>
+          <p:cNvSpPr/>
+          <p:nvPr/>
+        </p:nvSpPr>
+        <p:spPr>
+          <a:xfrm>
+            <a:off x="1077238" y="1640909"/>
+            <a:ext cx="2968668" cy="1440494"/>
+          </a:xfrm>
+          <a:prstGeom prst="rect">
+            <a:avLst/>
+          </a:prstGeom>
+        </p:spPr>
+        <p:style>
+          <a:lnRef idx="2">
+            <a:schemeClr val="accent1">
+              <a:shade val="50000"/>
+            </a:schemeClr>
+          </a:lnRef>
+          <a:fillRef idx="1">
+            <a:schemeClr val="accent1"/>
+          </a:fillRef>
+          <a:effectRef idx="0">
+            <a:schemeClr val="accent1"/>
+          </a:effectRef>
+          <a:fontRef idx="minor">
+            <a:schemeClr val="lt1"/>
+          </a:fontRef>
+        </p:style>
+        <p:txBody>
+          <a:bodyPr rtlCol="0" anchor="ctr"/>
+          <a:lstStyle/>
+          <a:p>
+            <a:pPr algn="ctr"/>
+            <a:endParaRPr lang="en-US"/>
+          </a:p>
+        </p:txBody>
+      </p:sp>
+      <p:sp>
+        <p:nvSpPr>
+          <p:cNvPr id="4" name="Rectangle 3"/>
+          <p:cNvSpPr/>
+          <p:nvPr/>
+        </p:nvSpPr>
+        <p:spPr>
+          <a:xfrm>
+            <a:off x="5701430" y="1640909"/>
+            <a:ext cx="2968668" cy="1440494"/>
+          </a:xfrm>
+          <a:prstGeom prst="rect">
+            <a:avLst/>
+          </a:prstGeom>
+          <a:solidFill>
+            <a:schemeClr val="accent4">
+              <a:lumMod val="60000"/>
+              <a:lumOff val="40000"/>
+            </a:schemeClr>
+          </a:solidFill>
+          <a:ln>
+            <a:solidFill>
+              <a:schemeClr val="accent4">
+                <a:lumMod val="60000"/>
+                <a:lumOff val="40000"/>
+              </a:schemeClr>
+            </a:solidFill>
+          </a:ln>
+        </p:spPr>
+        <p:style>
+          <a:lnRef idx="2">
+            <a:schemeClr val="accent1">
+              <a:shade val="50000"/>
+            </a:schemeClr>
+          </a:lnRef>
+          <a:fillRef idx="1">
+            <a:schemeClr val="accent1"/>
+          </a:fillRef>
+          <a:effectRef idx="0">
+            <a:schemeClr val="accent1"/>
+          </a:effectRef>
+          <a:fontRef idx="minor">
+            <a:schemeClr val="lt1"/>
+          </a:fontRef>
+        </p:style>
+        <p:txBody>
+          <a:bodyPr rtlCol="0" anchor="ctr"/>
+          <a:lstStyle/>
+          <a:p>
+            <a:pPr algn="ctr"/>
+            <a:endParaRPr lang="en-US"/>
+          </a:p>
+        </p:txBody>
+      </p:sp>
+      <p:sp>
+        <p:nvSpPr>
+          <p:cNvPr id="5" name="TextBox 4"/>
+          <p:cNvSpPr txBox="1"/>
+          <p:nvPr/>
+        </p:nvSpPr>
+        <p:spPr>
+          <a:xfrm>
+            <a:off x="1377862" y="1199274"/>
+            <a:ext cx="2580361" cy="369332"/>
+          </a:xfrm>
+          <a:prstGeom prst="rect">
+            <a:avLst/>
+          </a:prstGeom>
+          <a:noFill/>
+        </p:spPr>
+        <p:txBody>
+          <a:bodyPr wrap="square" rtlCol="0">
+            <a:spAutoFit/>
+          </a:bodyPr>
+          <a:lstStyle/>
+          <a:p>
+            <a:r>
+              <a:rPr lang="en-US" dirty="0" smtClean="0"/>
+              <a:t>ERP	</a:t>
+            </a:r>
+            <a:endParaRPr lang="en-US" dirty="0"/>
+          </a:p>
+        </p:txBody>
+      </p:sp>
+      <p:sp>
+        <p:nvSpPr>
+          <p:cNvPr id="6" name="TextBox 5"/>
+          <p:cNvSpPr txBox="1"/>
+          <p:nvPr/>
+        </p:nvSpPr>
+        <p:spPr>
+          <a:xfrm>
+            <a:off x="6651320" y="1199274"/>
+            <a:ext cx="1691014" cy="369332"/>
+          </a:xfrm>
+          <a:prstGeom prst="rect">
+            <a:avLst/>
+          </a:prstGeom>
+          <a:noFill/>
+        </p:spPr>
+        <p:txBody>
+          <a:bodyPr wrap="square" rtlCol="0">
+            <a:spAutoFit/>
+          </a:bodyPr>
+          <a:lstStyle/>
+          <a:p>
+            <a:r>
+              <a:rPr lang="en-US" dirty="0" smtClean="0"/>
+              <a:t>CRM</a:t>
+            </a:r>
+            <a:endParaRPr lang="en-US" dirty="0"/>
+          </a:p>
+        </p:txBody>
+      </p:sp>
+      <p:sp>
+        <p:nvSpPr>
+          <p:cNvPr id="7" name="TextBox 6"/>
+          <p:cNvSpPr txBox="1"/>
+          <p:nvPr/>
+        </p:nvSpPr>
+        <p:spPr>
+          <a:xfrm>
+            <a:off x="1189973" y="1778696"/>
+            <a:ext cx="789139" cy="369332"/>
+          </a:xfrm>
+          <a:prstGeom prst="rect">
+            <a:avLst/>
+          </a:prstGeom>
+          <a:noFill/>
+        </p:spPr>
+        <p:txBody>
+          <a:bodyPr wrap="square" rtlCol="0">
+            <a:spAutoFit/>
+          </a:bodyPr>
+          <a:lstStyle/>
+          <a:p>
+            <a:r>
+              <a:rPr lang="en-US" dirty="0" smtClean="0"/>
+              <a:t>?</a:t>
+            </a:r>
+            <a:endParaRPr lang="en-US" dirty="0"/>
+          </a:p>
+        </p:txBody>
+      </p:sp>
+      <p:sp>
+        <p:nvSpPr>
+          <p:cNvPr id="8" name="TextBox 7"/>
+          <p:cNvSpPr txBox="1"/>
+          <p:nvPr/>
+        </p:nvSpPr>
+        <p:spPr>
+          <a:xfrm>
+            <a:off x="5837128" y="1778696"/>
+            <a:ext cx="1089764" cy="369332"/>
+          </a:xfrm>
+          <a:prstGeom prst="rect">
+            <a:avLst/>
+          </a:prstGeom>
+          <a:noFill/>
+        </p:spPr>
+        <p:txBody>
+          <a:bodyPr wrap="square" rtlCol="0">
+            <a:spAutoFit/>
+          </a:bodyPr>
+          <a:lstStyle/>
+          <a:p>
+            <a:r>
+              <a:rPr lang="en-US" dirty="0" smtClean="0"/>
+              <a:t>?</a:t>
+            </a:r>
+            <a:endParaRPr lang="en-US" dirty="0"/>
+          </a:p>
+        </p:txBody>
+      </p:sp>
+      <p:sp>
+        <p:nvSpPr>
+          <p:cNvPr id="9" name="Rectangle 8"/>
+          <p:cNvSpPr/>
+          <p:nvPr/>
+        </p:nvSpPr>
+        <p:spPr>
+          <a:xfrm>
+            <a:off x="1784263" y="1765126"/>
+            <a:ext cx="1352811" cy="413359"/>
+          </a:xfrm>
+          <a:prstGeom prst="rect">
+            <a:avLst/>
+          </a:prstGeom>
+          <a:solidFill>
+            <a:srgbClr val="FFC000"/>
+          </a:solidFill>
+        </p:spPr>
+        <p:style>
+          <a:lnRef idx="2">
+            <a:schemeClr val="accent1">
+              <a:shade val="50000"/>
+            </a:schemeClr>
+          </a:lnRef>
+          <a:fillRef idx="1">
+            <a:schemeClr val="accent1"/>
+          </a:fillRef>
+          <a:effectRef idx="0">
+            <a:schemeClr val="accent1"/>
+          </a:effectRef>
+          <a:fontRef idx="minor">
+            <a:schemeClr val="lt1"/>
+          </a:fontRef>
+        </p:style>
+        <p:txBody>
+          <a:bodyPr rtlCol="0" anchor="ctr"/>
+          <a:lstStyle/>
+          <a:p>
+            <a:pPr algn="ctr"/>
+            <a:endParaRPr lang="en-US"/>
+          </a:p>
+        </p:txBody>
+      </p:sp>
+      <p:sp>
+        <p:nvSpPr>
+          <p:cNvPr id="10" name="Rectangle 9"/>
+          <p:cNvSpPr/>
+          <p:nvPr/>
+        </p:nvSpPr>
+        <p:spPr>
+          <a:xfrm>
+            <a:off x="1784262" y="2560528"/>
+            <a:ext cx="1352811" cy="413359"/>
+          </a:xfrm>
+          <a:prstGeom prst="rect">
+            <a:avLst/>
+          </a:prstGeom>
+          <a:solidFill>
+            <a:srgbClr val="FFC000"/>
+          </a:solidFill>
+        </p:spPr>
+        <p:style>
+          <a:lnRef idx="2">
+            <a:schemeClr val="accent1">
+              <a:shade val="50000"/>
+            </a:schemeClr>
+          </a:lnRef>
+          <a:fillRef idx="1">
+            <a:schemeClr val="accent1"/>
+          </a:fillRef>
+          <a:effectRef idx="0">
+            <a:schemeClr val="accent1"/>
+          </a:effectRef>
+          <a:fontRef idx="minor">
+            <a:schemeClr val="lt1"/>
+          </a:fontRef>
+        </p:style>
+        <p:txBody>
+          <a:bodyPr rtlCol="0" anchor="ctr"/>
+          <a:lstStyle/>
+          <a:p>
+            <a:pPr algn="ctr"/>
+            <a:endParaRPr lang="en-US"/>
+          </a:p>
+        </p:txBody>
+      </p:sp>
+      <p:sp>
+        <p:nvSpPr>
+          <p:cNvPr id="11" name="Rectangle 10"/>
+          <p:cNvSpPr/>
+          <p:nvPr/>
+        </p:nvSpPr>
+        <p:spPr>
+          <a:xfrm>
+            <a:off x="6356263" y="1765126"/>
+            <a:ext cx="1352811" cy="413359"/>
+          </a:xfrm>
+          <a:prstGeom prst="rect">
+            <a:avLst/>
+          </a:prstGeom>
+          <a:solidFill>
+            <a:srgbClr val="92D050"/>
+          </a:solidFill>
+        </p:spPr>
+        <p:style>
+          <a:lnRef idx="2">
+            <a:schemeClr val="accent1">
+              <a:shade val="50000"/>
+            </a:schemeClr>
+          </a:lnRef>
+          <a:fillRef idx="1">
+            <a:schemeClr val="accent1"/>
+          </a:fillRef>
+          <a:effectRef idx="0">
+            <a:schemeClr val="accent1"/>
+          </a:effectRef>
+          <a:fontRef idx="minor">
+            <a:schemeClr val="lt1"/>
+          </a:fontRef>
+        </p:style>
+        <p:txBody>
+          <a:bodyPr rtlCol="0" anchor="ctr"/>
+          <a:lstStyle/>
+          <a:p>
+            <a:pPr algn="ctr"/>
+            <a:endParaRPr lang="en-US"/>
+          </a:p>
+        </p:txBody>
+      </p:sp>
+      <p:sp>
+        <p:nvSpPr>
+          <p:cNvPr id="12" name="Rectangle 11"/>
+          <p:cNvSpPr/>
+          <p:nvPr/>
+        </p:nvSpPr>
+        <p:spPr>
+          <a:xfrm>
+            <a:off x="6356263" y="2560528"/>
+            <a:ext cx="1352811" cy="413359"/>
+          </a:xfrm>
+          <a:prstGeom prst="rect">
+            <a:avLst/>
+          </a:prstGeom>
+          <a:solidFill>
+            <a:srgbClr val="92D050"/>
+          </a:solidFill>
+        </p:spPr>
+        <p:style>
+          <a:lnRef idx="2">
+            <a:schemeClr val="accent1">
+              <a:shade val="50000"/>
+            </a:schemeClr>
+          </a:lnRef>
+          <a:fillRef idx="1">
+            <a:schemeClr val="accent1"/>
+          </a:fillRef>
+          <a:effectRef idx="0">
+            <a:schemeClr val="accent1"/>
+          </a:effectRef>
+          <a:fontRef idx="minor">
+            <a:schemeClr val="lt1"/>
+          </a:fontRef>
+        </p:style>
+        <p:txBody>
+          <a:bodyPr rtlCol="0" anchor="ctr"/>
+          <a:lstStyle/>
+          <a:p>
+            <a:pPr algn="ctr"/>
+            <a:endParaRPr lang="en-US"/>
+          </a:p>
+        </p:txBody>
+      </p:sp>
+      <p:sp>
+        <p:nvSpPr>
+          <p:cNvPr id="13" name="TextBox 12"/>
+          <p:cNvSpPr txBox="1"/>
+          <p:nvPr/>
+        </p:nvSpPr>
+        <p:spPr>
+          <a:xfrm>
+            <a:off x="1784262" y="1778696"/>
+            <a:ext cx="983990" cy="369332"/>
+          </a:xfrm>
+          <a:prstGeom prst="rect">
+            <a:avLst/>
+          </a:prstGeom>
+          <a:noFill/>
+        </p:spPr>
+        <p:txBody>
+          <a:bodyPr wrap="square" rtlCol="0">
+            <a:spAutoFit/>
+          </a:bodyPr>
+          <a:lstStyle/>
+          <a:p>
+            <a:r>
+              <a:rPr lang="en-US" dirty="0" smtClean="0"/>
+              <a:t>?</a:t>
+            </a:r>
+            <a:endParaRPr lang="en-US" dirty="0"/>
+          </a:p>
+        </p:txBody>
+      </p:sp>
+      <p:sp>
+        <p:nvSpPr>
+          <p:cNvPr id="14" name="TextBox 13"/>
+          <p:cNvSpPr txBox="1"/>
+          <p:nvPr/>
+        </p:nvSpPr>
+        <p:spPr>
+          <a:xfrm>
+            <a:off x="1784262" y="2560528"/>
+            <a:ext cx="883780" cy="369332"/>
+          </a:xfrm>
+          <a:prstGeom prst="rect">
+            <a:avLst/>
+          </a:prstGeom>
+          <a:noFill/>
+        </p:spPr>
+        <p:txBody>
+          <a:bodyPr wrap="square" rtlCol="0">
+            <a:spAutoFit/>
+          </a:bodyPr>
+          <a:lstStyle/>
+          <a:p>
+            <a:r>
+              <a:rPr lang="en-US" dirty="0" smtClean="0"/>
+              <a:t>?</a:t>
+            </a:r>
+            <a:endParaRPr lang="en-US" dirty="0"/>
+          </a:p>
+        </p:txBody>
+      </p:sp>
+      <p:sp>
+        <p:nvSpPr>
+          <p:cNvPr id="15" name="TextBox 14"/>
+          <p:cNvSpPr txBox="1"/>
+          <p:nvPr/>
+        </p:nvSpPr>
+        <p:spPr>
+          <a:xfrm>
+            <a:off x="6356263" y="1778696"/>
+            <a:ext cx="829501" cy="369332"/>
+          </a:xfrm>
+          <a:prstGeom prst="rect">
+            <a:avLst/>
+          </a:prstGeom>
+          <a:noFill/>
+        </p:spPr>
+        <p:txBody>
+          <a:bodyPr wrap="square" rtlCol="0">
+            <a:spAutoFit/>
+          </a:bodyPr>
+          <a:lstStyle/>
+          <a:p>
+            <a:r>
+              <a:rPr lang="en-US" dirty="0" smtClean="0"/>
+              <a:t>?</a:t>
+            </a:r>
+            <a:endParaRPr lang="en-US" dirty="0"/>
+          </a:p>
+        </p:txBody>
+      </p:sp>
+      <p:sp>
+        <p:nvSpPr>
+          <p:cNvPr id="16" name="TextBox 15"/>
+          <p:cNvSpPr txBox="1"/>
+          <p:nvPr/>
+        </p:nvSpPr>
+        <p:spPr>
+          <a:xfrm>
+            <a:off x="6356263" y="2560528"/>
+            <a:ext cx="676405" cy="369332"/>
+          </a:xfrm>
+          <a:prstGeom prst="rect">
+            <a:avLst/>
+          </a:prstGeom>
+          <a:noFill/>
+        </p:spPr>
+        <p:txBody>
+          <a:bodyPr wrap="square" rtlCol="0">
+            <a:spAutoFit/>
+          </a:bodyPr>
+          <a:lstStyle/>
+          <a:p>
+            <a:r>
+              <a:rPr lang="en-US" dirty="0" smtClean="0"/>
+              <a:t>?</a:t>
+            </a:r>
+            <a:endParaRPr lang="en-US" dirty="0"/>
+          </a:p>
+        </p:txBody>
+      </p:sp>
+      <p:sp>
+        <p:nvSpPr>
+          <p:cNvPr id="17" name="TextBox 16"/>
+          <p:cNvSpPr txBox="1"/>
+          <p:nvPr/>
+        </p:nvSpPr>
+        <p:spPr>
+          <a:xfrm>
+            <a:off x="1784262" y="2178485"/>
+            <a:ext cx="1352811" cy="382043"/>
+          </a:xfrm>
+          <a:prstGeom prst="rect">
+            <a:avLst/>
+          </a:prstGeom>
+          <a:noFill/>
+        </p:spPr>
+        <p:txBody>
+          <a:bodyPr wrap="square" rtlCol="0">
+            <a:spAutoFit/>
+          </a:bodyPr>
+          <a:lstStyle/>
+          <a:p>
+            <a:r>
+              <a:rPr lang="en-US" dirty="0" smtClean="0"/>
+              <a:t>…</a:t>
+            </a:r>
+            <a:endParaRPr lang="en-US" dirty="0"/>
+          </a:p>
+        </p:txBody>
+      </p:sp>
+      <p:sp>
+        <p:nvSpPr>
+          <p:cNvPr id="18" name="TextBox 17"/>
+          <p:cNvSpPr txBox="1"/>
+          <p:nvPr/>
+        </p:nvSpPr>
+        <p:spPr>
+          <a:xfrm>
+            <a:off x="6382010" y="2178485"/>
+            <a:ext cx="908138" cy="382043"/>
+          </a:xfrm>
+          <a:prstGeom prst="rect">
+            <a:avLst/>
+          </a:prstGeom>
+          <a:noFill/>
+        </p:spPr>
+        <p:txBody>
+          <a:bodyPr wrap="square" rtlCol="0">
+            <a:spAutoFit/>
+          </a:bodyPr>
+          <a:lstStyle/>
+          <a:p>
+            <a:r>
+              <a:rPr lang="en-US" dirty="0" smtClean="0"/>
+              <a:t>…</a:t>
+            </a:r>
+            <a:endParaRPr lang="en-US" dirty="0"/>
+          </a:p>
+        </p:txBody>
+      </p:sp>
+      <p:cxnSp>
+        <p:nvCxnSpPr>
+          <p:cNvPr id="23" name="Elbow Connector 22"/>
+          <p:cNvCxnSpPr/>
+          <p:nvPr/>
+        </p:nvCxnSpPr>
+        <p:spPr>
+          <a:xfrm flipV="1">
+            <a:off x="3160386" y="1958049"/>
+            <a:ext cx="3193092" cy="13756"/>
+          </a:xfrm>
+          <a:prstGeom prst="bentConnector3">
+            <a:avLst/>
+          </a:prstGeom>
+          <a:ln w="38100">
+            <a:solidFill>
+              <a:srgbClr val="FF0000"/>
+            </a:solidFill>
+            <a:headEnd type="triangle"/>
+            <a:tailEnd type="triangle"/>
+          </a:ln>
+        </p:spPr>
+        <p:style>
+          <a:lnRef idx="1">
+            <a:schemeClr val="accent1"/>
+          </a:lnRef>
+          <a:fillRef idx="0">
+            <a:schemeClr val="accent1"/>
+          </a:fillRef>
+          <a:effectRef idx="0">
+            <a:schemeClr val="accent1"/>
+          </a:effectRef>
+          <a:fontRef idx="minor">
+            <a:schemeClr val="tx1"/>
+          </a:fontRef>
+        </p:style>
+      </p:cxnSp>
+    </p:spTree>
+    <p:extLst>
+      <p:ext uri="{BB962C8B-B14F-4D97-AF65-F5344CB8AC3E}">
+        <p14:creationId xmlns:p14="http://schemas.microsoft.com/office/powerpoint/2010/main" val="1838358244"/>
       </p:ext>
     </p:extLst>
   </p:cSld>

</xml_diff>

<commit_message>
add note to team
</commit_message>
<xml_diff>
--- a/Jerry.pptx
+++ b/Jerry.pptx
@@ -223,7 +223,7 @@
           <a:p>
             <a:fld id="{C1FFF932-AE32-4CB2-A004-ABC55BBBB993}" type="datetimeFigureOut">
               <a:rPr lang="en-US" smtClean="0"/>
-              <a:t>2016-06-19</a:t>
+              <a:t>2016-06-20</a:t>
             </a:fld>
             <a:endParaRPr lang="en-US"/>
           </a:p>
@@ -2260,7 +2260,7 @@
           <a:p>
             <a:fld id="{32885C6E-53D4-4DF2-B9C6-C242624B2A8A}" type="datetimeFigureOut">
               <a:rPr lang="en-US" smtClean="0"/>
-              <a:t>2016-06-19</a:t>
+              <a:t>2016-06-20</a:t>
             </a:fld>
             <a:endParaRPr lang="en-US"/>
           </a:p>
@@ -2430,7 +2430,7 @@
           <a:p>
             <a:fld id="{32885C6E-53D4-4DF2-B9C6-C242624B2A8A}" type="datetimeFigureOut">
               <a:rPr lang="en-US" smtClean="0"/>
-              <a:t>2016-06-19</a:t>
+              <a:t>2016-06-20</a:t>
             </a:fld>
             <a:endParaRPr lang="en-US"/>
           </a:p>
@@ -2610,7 +2610,7 @@
           <a:p>
             <a:fld id="{32885C6E-53D4-4DF2-B9C6-C242624B2A8A}" type="datetimeFigureOut">
               <a:rPr lang="en-US" smtClean="0"/>
-              <a:t>2016-06-19</a:t>
+              <a:t>2016-06-20</a:t>
             </a:fld>
             <a:endParaRPr lang="en-US"/>
           </a:p>
@@ -2780,7 +2780,7 @@
           <a:p>
             <a:fld id="{32885C6E-53D4-4DF2-B9C6-C242624B2A8A}" type="datetimeFigureOut">
               <a:rPr lang="en-US" smtClean="0"/>
-              <a:t>2016-06-19</a:t>
+              <a:t>2016-06-20</a:t>
             </a:fld>
             <a:endParaRPr lang="en-US"/>
           </a:p>
@@ -3026,7 +3026,7 @@
           <a:p>
             <a:fld id="{32885C6E-53D4-4DF2-B9C6-C242624B2A8A}" type="datetimeFigureOut">
               <a:rPr lang="en-US" smtClean="0"/>
-              <a:t>2016-06-19</a:t>
+              <a:t>2016-06-20</a:t>
             </a:fld>
             <a:endParaRPr lang="en-US"/>
           </a:p>
@@ -3258,7 +3258,7 @@
           <a:p>
             <a:fld id="{32885C6E-53D4-4DF2-B9C6-C242624B2A8A}" type="datetimeFigureOut">
               <a:rPr lang="en-US" smtClean="0"/>
-              <a:t>2016-06-19</a:t>
+              <a:t>2016-06-20</a:t>
             </a:fld>
             <a:endParaRPr lang="en-US"/>
           </a:p>
@@ -3625,7 +3625,7 @@
           <a:p>
             <a:fld id="{32885C6E-53D4-4DF2-B9C6-C242624B2A8A}" type="datetimeFigureOut">
               <a:rPr lang="en-US" smtClean="0"/>
-              <a:t>2016-06-19</a:t>
+              <a:t>2016-06-20</a:t>
             </a:fld>
             <a:endParaRPr lang="en-US"/>
           </a:p>
@@ -3743,7 +3743,7 @@
           <a:p>
             <a:fld id="{32885C6E-53D4-4DF2-B9C6-C242624B2A8A}" type="datetimeFigureOut">
               <a:rPr lang="en-US" smtClean="0"/>
-              <a:t>2016-06-19</a:t>
+              <a:t>2016-06-20</a:t>
             </a:fld>
             <a:endParaRPr lang="en-US"/>
           </a:p>
@@ -3838,7 +3838,7 @@
           <a:p>
             <a:fld id="{32885C6E-53D4-4DF2-B9C6-C242624B2A8A}" type="datetimeFigureOut">
               <a:rPr lang="en-US" smtClean="0"/>
-              <a:t>2016-06-19</a:t>
+              <a:t>2016-06-20</a:t>
             </a:fld>
             <a:endParaRPr lang="en-US"/>
           </a:p>
@@ -4115,7 +4115,7 @@
           <a:p>
             <a:fld id="{32885C6E-53D4-4DF2-B9C6-C242624B2A8A}" type="datetimeFigureOut">
               <a:rPr lang="en-US" smtClean="0"/>
-              <a:t>2016-06-19</a:t>
+              <a:t>2016-06-20</a:t>
             </a:fld>
             <a:endParaRPr lang="en-US"/>
           </a:p>
@@ -4368,7 +4368,7 @@
           <a:p>
             <a:fld id="{32885C6E-53D4-4DF2-B9C6-C242624B2A8A}" type="datetimeFigureOut">
               <a:rPr lang="en-US" smtClean="0"/>
-              <a:t>2016-06-19</a:t>
+              <a:t>2016-06-20</a:t>
             </a:fld>
             <a:endParaRPr lang="en-US"/>
           </a:p>
@@ -4581,7 +4581,7 @@
           <a:p>
             <a:fld id="{32885C6E-53D4-4DF2-B9C6-C242624B2A8A}" type="datetimeFigureOut">
               <a:rPr lang="en-US" smtClean="0"/>
-              <a:t>2016-06-19</a:t>
+              <a:t>2016-06-20</a:t>
             </a:fld>
             <a:endParaRPr lang="en-US"/>
           </a:p>
@@ -14739,133 +14739,58 @@
       </p:grpSpPr>
       <p:pic>
         <p:nvPicPr>
-          <p:cNvPr id="1026" name="Picture 2" descr="C:\Users\i042416\AppData\Local\YNote\data\cle.ee@163.com\10f3412bc0cb4e65abbc8f9e8613f37a\clipboard.png"/>
+          <p:cNvPr id="4" name="Picture 3"/>
           <p:cNvPicPr>
-            <a:picLocks noChangeAspect="1" noChangeArrowheads="1"/>
+            <a:picLocks noChangeAspect="1"/>
           </p:cNvPicPr>
           <p:nvPr/>
         </p:nvPicPr>
         <p:blipFill>
-          <a:blip r:embed="rId2">
-            <a:extLst>
-              <a:ext uri="{28A0092B-C50C-407E-A947-70E740481C1C}">
-                <a14:useLocalDpi xmlns:a14="http://schemas.microsoft.com/office/drawing/2010/main" val="0"/>
-              </a:ext>
-            </a:extLst>
-          </a:blip>
-          <a:srcRect/>
+          <a:blip r:embed="rId2"/>
           <a:stretch>
             <a:fillRect/>
           </a:stretch>
         </p:blipFill>
-        <p:spPr bwMode="auto">
-          <a:xfrm>
-            <a:off x="143049" y="168058"/>
-            <a:ext cx="5619750" cy="3019425"/>
+        <p:spPr>
+          <a:xfrm>
+            <a:off x="187890" y="118354"/>
+            <a:ext cx="6755772" cy="3116482"/>
           </a:xfrm>
           <a:prstGeom prst="rect">
             <a:avLst/>
           </a:prstGeom>
-          <a:noFill/>
-          <a:ln w="25400">
+        </p:spPr>
+      </p:pic>
+      <p:pic>
+        <p:nvPicPr>
+          <p:cNvPr id="5" name="Picture 4"/>
+          <p:cNvPicPr>
+            <a:picLocks noChangeAspect="1"/>
+          </p:cNvPicPr>
+          <p:nvPr/>
+        </p:nvPicPr>
+        <p:blipFill>
+          <a:blip r:embed="rId3"/>
+          <a:stretch>
+            <a:fillRect/>
+          </a:stretch>
+        </p:blipFill>
+        <p:spPr>
+          <a:xfrm>
+            <a:off x="2818356" y="2390973"/>
+            <a:ext cx="7495589" cy="4147603"/>
+          </a:xfrm>
+          <a:prstGeom prst="rect">
+            <a:avLst/>
+          </a:prstGeom>
+          <a:solidFill>
+            <a:schemeClr val="accent1"/>
+          </a:solidFill>
+          <a:ln>
             <a:solidFill>
               <a:schemeClr val="accent1"/>
             </a:solidFill>
           </a:ln>
-          <a:extLst>
-            <a:ext uri="{909E8E84-426E-40DD-AFC4-6F175D3DCCD1}">
-              <a14:hiddenFill xmlns:a14="http://schemas.microsoft.com/office/drawing/2010/main">
-                <a:solidFill>
-                  <a:srgbClr val="FFFFFF"/>
-                </a:solidFill>
-              </a14:hiddenFill>
-            </a:ext>
-          </a:extLst>
-        </p:spPr>
-      </p:pic>
-      <p:pic>
-        <p:nvPicPr>
-          <p:cNvPr id="1028" name="Picture 4" descr="C:\Users\i042416\AppData\Local\YNote\data\cle.ee@163.com\9864fee6eabe4b5faf0a4e23bcaa1a80\clipboard.png"/>
-          <p:cNvPicPr>
-            <a:picLocks noChangeAspect="1" noChangeArrowheads="1"/>
-          </p:cNvPicPr>
-          <p:nvPr/>
-        </p:nvPicPr>
-        <p:blipFill>
-          <a:blip r:embed="rId3">
-            <a:extLst>
-              <a:ext uri="{28A0092B-C50C-407E-A947-70E740481C1C}">
-                <a14:useLocalDpi xmlns:a14="http://schemas.microsoft.com/office/drawing/2010/main" val="0"/>
-              </a:ext>
-            </a:extLst>
-          </a:blip>
-          <a:srcRect/>
-          <a:stretch>
-            <a:fillRect/>
-          </a:stretch>
-        </p:blipFill>
-        <p:spPr bwMode="auto">
-          <a:xfrm>
-            <a:off x="6318381" y="327982"/>
-            <a:ext cx="4581525" cy="2038350"/>
-          </a:xfrm>
-          <a:prstGeom prst="rect">
-            <a:avLst/>
-          </a:prstGeom>
-          <a:solidFill>
-            <a:schemeClr val="bg1"/>
-          </a:solidFill>
-          <a:ln w="25400">
-            <a:solidFill>
-              <a:srgbClr val="FF0000"/>
-            </a:solidFill>
-          </a:ln>
-        </p:spPr>
-      </p:pic>
-      <p:pic>
-        <p:nvPicPr>
-          <p:cNvPr id="1030" name="Picture 6" descr="C:\Users\i042416\AppData\Local\YNote\data\cle.ee@163.com\85981c37915148edaa609b1a715a7916\clipboard.png"/>
-          <p:cNvPicPr>
-            <a:picLocks noChangeAspect="1" noChangeArrowheads="1"/>
-          </p:cNvPicPr>
-          <p:nvPr/>
-        </p:nvPicPr>
-        <p:blipFill>
-          <a:blip r:embed="rId4">
-            <a:extLst>
-              <a:ext uri="{28A0092B-C50C-407E-A947-70E740481C1C}">
-                <a14:useLocalDpi xmlns:a14="http://schemas.microsoft.com/office/drawing/2010/main" val="0"/>
-              </a:ext>
-            </a:extLst>
-          </a:blip>
-          <a:srcRect/>
-          <a:stretch>
-            <a:fillRect/>
-          </a:stretch>
-        </p:blipFill>
-        <p:spPr bwMode="auto">
-          <a:xfrm>
-            <a:off x="3118982" y="3452345"/>
-            <a:ext cx="8443499" cy="3017347"/>
-          </a:xfrm>
-          <a:prstGeom prst="rect">
-            <a:avLst/>
-          </a:prstGeom>
-          <a:noFill/>
-          <a:ln w="25400">
-            <a:solidFill>
-              <a:srgbClr val="FF0000"/>
-            </a:solidFill>
-          </a:ln>
-          <a:extLst>
-            <a:ext uri="{909E8E84-426E-40DD-AFC4-6F175D3DCCD1}">
-              <a14:hiddenFill xmlns:a14="http://schemas.microsoft.com/office/drawing/2010/main">
-                <a:solidFill>
-                  <a:srgbClr val="FFFFFF"/>
-                </a:solidFill>
-              </a14:hiddenFill>
-            </a:ext>
-          </a:extLst>
         </p:spPr>
       </p:pic>
     </p:spTree>

</xml_diff>

<commit_message>
did not swim for 4 days
</commit_message>
<xml_diff>
--- a/Jerry.pptx
+++ b/Jerry.pptx
@@ -223,7 +223,7 @@
           <a:p>
             <a:fld id="{C1FFF932-AE32-4CB2-A004-ABC55BBBB993}" type="datetimeFigureOut">
               <a:rPr lang="en-US" smtClean="0"/>
-              <a:t>2016-06-23</a:t>
+              <a:t>2016-06-24</a:t>
             </a:fld>
             <a:endParaRPr lang="en-US"/>
           </a:p>
@@ -2260,7 +2260,7 @@
           <a:p>
             <a:fld id="{32885C6E-53D4-4DF2-B9C6-C242624B2A8A}" type="datetimeFigureOut">
               <a:rPr lang="en-US" smtClean="0"/>
-              <a:t>2016-06-23</a:t>
+              <a:t>2016-06-24</a:t>
             </a:fld>
             <a:endParaRPr lang="en-US"/>
           </a:p>
@@ -2430,7 +2430,7 @@
           <a:p>
             <a:fld id="{32885C6E-53D4-4DF2-B9C6-C242624B2A8A}" type="datetimeFigureOut">
               <a:rPr lang="en-US" smtClean="0"/>
-              <a:t>2016-06-23</a:t>
+              <a:t>2016-06-24</a:t>
             </a:fld>
             <a:endParaRPr lang="en-US"/>
           </a:p>
@@ -2610,7 +2610,7 @@
           <a:p>
             <a:fld id="{32885C6E-53D4-4DF2-B9C6-C242624B2A8A}" type="datetimeFigureOut">
               <a:rPr lang="en-US" smtClean="0"/>
-              <a:t>2016-06-23</a:t>
+              <a:t>2016-06-24</a:t>
             </a:fld>
             <a:endParaRPr lang="en-US"/>
           </a:p>
@@ -2780,7 +2780,7 @@
           <a:p>
             <a:fld id="{32885C6E-53D4-4DF2-B9C6-C242624B2A8A}" type="datetimeFigureOut">
               <a:rPr lang="en-US" smtClean="0"/>
-              <a:t>2016-06-23</a:t>
+              <a:t>2016-06-24</a:t>
             </a:fld>
             <a:endParaRPr lang="en-US"/>
           </a:p>
@@ -3026,7 +3026,7 @@
           <a:p>
             <a:fld id="{32885C6E-53D4-4DF2-B9C6-C242624B2A8A}" type="datetimeFigureOut">
               <a:rPr lang="en-US" smtClean="0"/>
-              <a:t>2016-06-23</a:t>
+              <a:t>2016-06-24</a:t>
             </a:fld>
             <a:endParaRPr lang="en-US"/>
           </a:p>
@@ -3258,7 +3258,7 @@
           <a:p>
             <a:fld id="{32885C6E-53D4-4DF2-B9C6-C242624B2A8A}" type="datetimeFigureOut">
               <a:rPr lang="en-US" smtClean="0"/>
-              <a:t>2016-06-23</a:t>
+              <a:t>2016-06-24</a:t>
             </a:fld>
             <a:endParaRPr lang="en-US"/>
           </a:p>
@@ -3625,7 +3625,7 @@
           <a:p>
             <a:fld id="{32885C6E-53D4-4DF2-B9C6-C242624B2A8A}" type="datetimeFigureOut">
               <a:rPr lang="en-US" smtClean="0"/>
-              <a:t>2016-06-23</a:t>
+              <a:t>2016-06-24</a:t>
             </a:fld>
             <a:endParaRPr lang="en-US"/>
           </a:p>
@@ -3743,7 +3743,7 @@
           <a:p>
             <a:fld id="{32885C6E-53D4-4DF2-B9C6-C242624B2A8A}" type="datetimeFigureOut">
               <a:rPr lang="en-US" smtClean="0"/>
-              <a:t>2016-06-23</a:t>
+              <a:t>2016-06-24</a:t>
             </a:fld>
             <a:endParaRPr lang="en-US"/>
           </a:p>
@@ -3838,7 +3838,7 @@
           <a:p>
             <a:fld id="{32885C6E-53D4-4DF2-B9C6-C242624B2A8A}" type="datetimeFigureOut">
               <a:rPr lang="en-US" smtClean="0"/>
-              <a:t>2016-06-23</a:t>
+              <a:t>2016-06-24</a:t>
             </a:fld>
             <a:endParaRPr lang="en-US"/>
           </a:p>
@@ -4115,7 +4115,7 @@
           <a:p>
             <a:fld id="{32885C6E-53D4-4DF2-B9C6-C242624B2A8A}" type="datetimeFigureOut">
               <a:rPr lang="en-US" smtClean="0"/>
-              <a:t>2016-06-23</a:t>
+              <a:t>2016-06-24</a:t>
             </a:fld>
             <a:endParaRPr lang="en-US"/>
           </a:p>
@@ -4368,7 +4368,7 @@
           <a:p>
             <a:fld id="{32885C6E-53D4-4DF2-B9C6-C242624B2A8A}" type="datetimeFigureOut">
               <a:rPr lang="en-US" smtClean="0"/>
-              <a:t>2016-06-23</a:t>
+              <a:t>2016-06-24</a:t>
             </a:fld>
             <a:endParaRPr lang="en-US"/>
           </a:p>
@@ -4581,7 +4581,7 @@
           <a:p>
             <a:fld id="{32885C6E-53D4-4DF2-B9C6-C242624B2A8A}" type="datetimeFigureOut">
               <a:rPr lang="en-US" smtClean="0"/>
-              <a:t>2016-06-23</a:t>
+              <a:t>2016-06-24</a:t>
             </a:fld>
             <a:endParaRPr lang="en-US"/>
           </a:p>
@@ -14738,7 +14738,7 @@
       </p:grpSpPr>
       <p:pic>
         <p:nvPicPr>
-          <p:cNvPr id="4" name="Picture 3"/>
+          <p:cNvPr id="2" name="Picture 1"/>
           <p:cNvPicPr>
             <a:picLocks noChangeAspect="1"/>
           </p:cNvPicPr>
@@ -14752,44 +14752,12 @@
         </p:blipFill>
         <p:spPr>
           <a:xfrm>
-            <a:off x="187890" y="118354"/>
-            <a:ext cx="6755772" cy="3116482"/>
+            <a:off x="1949832" y="1685889"/>
+            <a:ext cx="10242168" cy="5014395"/>
           </a:xfrm>
           <a:prstGeom prst="rect">
             <a:avLst/>
           </a:prstGeom>
-        </p:spPr>
-      </p:pic>
-      <p:pic>
-        <p:nvPicPr>
-          <p:cNvPr id="5" name="Picture 4"/>
-          <p:cNvPicPr>
-            <a:picLocks noChangeAspect="1"/>
-          </p:cNvPicPr>
-          <p:nvPr/>
-        </p:nvPicPr>
-        <p:blipFill>
-          <a:blip r:embed="rId3"/>
-          <a:stretch>
-            <a:fillRect/>
-          </a:stretch>
-        </p:blipFill>
-        <p:spPr>
-          <a:xfrm>
-            <a:off x="2818356" y="2390973"/>
-            <a:ext cx="7495589" cy="4147603"/>
-          </a:xfrm>
-          <a:prstGeom prst="rect">
-            <a:avLst/>
-          </a:prstGeom>
-          <a:solidFill>
-            <a:schemeClr val="accent1"/>
-          </a:solidFill>
-          <a:ln>
-            <a:solidFill>
-              <a:schemeClr val="accent1"/>
-            </a:solidFill>
-          </a:ln>
         </p:spPr>
       </p:pic>
     </p:spTree>

</xml_diff>

<commit_message>
add OPA wait for aggregation
</commit_message>
<xml_diff>
--- a/Jerry.pptx
+++ b/Jerry.pptx
@@ -5,7 +5,7 @@
     <p:sldMasterId id="2147483648" r:id="rId1"/>
   </p:sldMasterIdLst>
   <p:notesMasterIdLst>
-    <p:notesMasterId r:id="rId29"/>
+    <p:notesMasterId r:id="rId31"/>
   </p:notesMasterIdLst>
   <p:sldIdLst>
     <p:sldId id="257" r:id="rId2"/>
@@ -35,6 +35,8 @@
     <p:sldId id="285" r:id="rId26"/>
     <p:sldId id="286" r:id="rId27"/>
     <p:sldId id="287" r:id="rId28"/>
+    <p:sldId id="288" r:id="rId29"/>
+    <p:sldId id="289" r:id="rId30"/>
   </p:sldIdLst>
   <p:sldSz cx="12192000" cy="6858000"/>
   <p:notesSz cx="6858000" cy="9144000"/>
@@ -223,7 +225,7 @@
           <a:p>
             <a:fld id="{C1FFF932-AE32-4CB2-A004-ABC55BBBB993}" type="datetimeFigureOut">
               <a:rPr lang="en-US" smtClean="0"/>
-              <a:t>2016-06-24</a:t>
+              <a:t>2016-07-06</a:t>
             </a:fld>
             <a:endParaRPr lang="en-US"/>
           </a:p>
@@ -2260,7 +2262,7 @@
           <a:p>
             <a:fld id="{32885C6E-53D4-4DF2-B9C6-C242624B2A8A}" type="datetimeFigureOut">
               <a:rPr lang="en-US" smtClean="0"/>
-              <a:t>2016-06-24</a:t>
+              <a:t>2016-07-06</a:t>
             </a:fld>
             <a:endParaRPr lang="en-US"/>
           </a:p>
@@ -2430,7 +2432,7 @@
           <a:p>
             <a:fld id="{32885C6E-53D4-4DF2-B9C6-C242624B2A8A}" type="datetimeFigureOut">
               <a:rPr lang="en-US" smtClean="0"/>
-              <a:t>2016-06-24</a:t>
+              <a:t>2016-07-06</a:t>
             </a:fld>
             <a:endParaRPr lang="en-US"/>
           </a:p>
@@ -2610,7 +2612,7 @@
           <a:p>
             <a:fld id="{32885C6E-53D4-4DF2-B9C6-C242624B2A8A}" type="datetimeFigureOut">
               <a:rPr lang="en-US" smtClean="0"/>
-              <a:t>2016-06-24</a:t>
+              <a:t>2016-07-06</a:t>
             </a:fld>
             <a:endParaRPr lang="en-US"/>
           </a:p>
@@ -2780,7 +2782,7 @@
           <a:p>
             <a:fld id="{32885C6E-53D4-4DF2-B9C6-C242624B2A8A}" type="datetimeFigureOut">
               <a:rPr lang="en-US" smtClean="0"/>
-              <a:t>2016-06-24</a:t>
+              <a:t>2016-07-06</a:t>
             </a:fld>
             <a:endParaRPr lang="en-US"/>
           </a:p>
@@ -3026,7 +3028,7 @@
           <a:p>
             <a:fld id="{32885C6E-53D4-4DF2-B9C6-C242624B2A8A}" type="datetimeFigureOut">
               <a:rPr lang="en-US" smtClean="0"/>
-              <a:t>2016-06-24</a:t>
+              <a:t>2016-07-06</a:t>
             </a:fld>
             <a:endParaRPr lang="en-US"/>
           </a:p>
@@ -3258,7 +3260,7 @@
           <a:p>
             <a:fld id="{32885C6E-53D4-4DF2-B9C6-C242624B2A8A}" type="datetimeFigureOut">
               <a:rPr lang="en-US" smtClean="0"/>
-              <a:t>2016-06-24</a:t>
+              <a:t>2016-07-06</a:t>
             </a:fld>
             <a:endParaRPr lang="en-US"/>
           </a:p>
@@ -3625,7 +3627,7 @@
           <a:p>
             <a:fld id="{32885C6E-53D4-4DF2-B9C6-C242624B2A8A}" type="datetimeFigureOut">
               <a:rPr lang="en-US" smtClean="0"/>
-              <a:t>2016-06-24</a:t>
+              <a:t>2016-07-06</a:t>
             </a:fld>
             <a:endParaRPr lang="en-US"/>
           </a:p>
@@ -3743,7 +3745,7 @@
           <a:p>
             <a:fld id="{32885C6E-53D4-4DF2-B9C6-C242624B2A8A}" type="datetimeFigureOut">
               <a:rPr lang="en-US" smtClean="0"/>
-              <a:t>2016-06-24</a:t>
+              <a:t>2016-07-06</a:t>
             </a:fld>
             <a:endParaRPr lang="en-US"/>
           </a:p>
@@ -3838,7 +3840,7 @@
           <a:p>
             <a:fld id="{32885C6E-53D4-4DF2-B9C6-C242624B2A8A}" type="datetimeFigureOut">
               <a:rPr lang="en-US" smtClean="0"/>
-              <a:t>2016-06-24</a:t>
+              <a:t>2016-07-06</a:t>
             </a:fld>
             <a:endParaRPr lang="en-US"/>
           </a:p>
@@ -4115,7 +4117,7 @@
           <a:p>
             <a:fld id="{32885C6E-53D4-4DF2-B9C6-C242624B2A8A}" type="datetimeFigureOut">
               <a:rPr lang="en-US" smtClean="0"/>
-              <a:t>2016-06-24</a:t>
+              <a:t>2016-07-06</a:t>
             </a:fld>
             <a:endParaRPr lang="en-US"/>
           </a:p>
@@ -4368,7 +4370,7 @@
           <a:p>
             <a:fld id="{32885C6E-53D4-4DF2-B9C6-C242624B2A8A}" type="datetimeFigureOut">
               <a:rPr lang="en-US" smtClean="0"/>
-              <a:t>2016-06-24</a:t>
+              <a:t>2016-07-06</a:t>
             </a:fld>
             <a:endParaRPr lang="en-US"/>
           </a:p>
@@ -4581,7 +4583,7 @@
           <a:p>
             <a:fld id="{32885C6E-53D4-4DF2-B9C6-C242624B2A8A}" type="datetimeFigureOut">
               <a:rPr lang="en-US" smtClean="0"/>
-              <a:t>2016-06-24</a:t>
+              <a:t>2016-07-06</a:t>
             </a:fld>
             <a:endParaRPr lang="en-US"/>
           </a:p>
@@ -15259,6 +15261,1392 @@
     <p:extLst>
       <p:ext uri="{BB962C8B-B14F-4D97-AF65-F5344CB8AC3E}">
         <p14:creationId xmlns:p14="http://schemas.microsoft.com/office/powerpoint/2010/main" val="2073363480"/>
+      </p:ext>
+    </p:extLst>
+  </p:cSld>
+  <p:clrMapOvr>
+    <a:masterClrMapping/>
+  </p:clrMapOvr>
+  <p:timing>
+    <p:tnLst>
+      <p:par>
+        <p:cTn id="1" dur="indefinite" restart="never" nodeType="tmRoot"/>
+      </p:par>
+    </p:tnLst>
+  </p:timing>
+</p:sld>
+</file>
+
+<file path=ppt/slides/slide28.xml><?xml version="1.0" encoding="utf-8"?>
+<p:sld xmlns:a="http://schemas.openxmlformats.org/drawingml/2006/main" xmlns:r="http://schemas.openxmlformats.org/officeDocument/2006/relationships" xmlns:p="http://schemas.openxmlformats.org/presentationml/2006/main">
+  <p:cSld>
+    <p:spTree>
+      <p:nvGrpSpPr>
+        <p:cNvPr id="1" name=""/>
+        <p:cNvGrpSpPr/>
+        <p:nvPr/>
+      </p:nvGrpSpPr>
+      <p:grpSpPr>
+        <a:xfrm>
+          <a:off x="0" y="0"/>
+          <a:ext cx="0" cy="0"/>
+          <a:chOff x="0" y="0"/>
+          <a:chExt cx="0" cy="0"/>
+        </a:xfrm>
+      </p:grpSpPr>
+      <p:cxnSp>
+        <p:nvCxnSpPr>
+          <p:cNvPr id="4" name="Straight Arrow Connector 3"/>
+          <p:cNvCxnSpPr/>
+          <p:nvPr/>
+        </p:nvCxnSpPr>
+        <p:spPr>
+          <a:xfrm>
+            <a:off x="688932" y="5423769"/>
+            <a:ext cx="9958191" cy="25052"/>
+          </a:xfrm>
+          <a:prstGeom prst="straightConnector1">
+            <a:avLst/>
+          </a:prstGeom>
+          <a:ln w="38100">
+            <a:tailEnd type="triangle"/>
+          </a:ln>
+        </p:spPr>
+        <p:style>
+          <a:lnRef idx="1">
+            <a:schemeClr val="accent1"/>
+          </a:lnRef>
+          <a:fillRef idx="0">
+            <a:schemeClr val="accent1"/>
+          </a:fillRef>
+          <a:effectRef idx="0">
+            <a:schemeClr val="accent1"/>
+          </a:effectRef>
+          <a:fontRef idx="minor">
+            <a:schemeClr val="tx1"/>
+          </a:fontRef>
+        </p:style>
+      </p:cxnSp>
+      <p:cxnSp>
+        <p:nvCxnSpPr>
+          <p:cNvPr id="6" name="Straight Arrow Connector 5"/>
+          <p:cNvCxnSpPr/>
+          <p:nvPr/>
+        </p:nvCxnSpPr>
+        <p:spPr>
+          <a:xfrm flipV="1">
+            <a:off x="688932" y="1215024"/>
+            <a:ext cx="0" cy="4233797"/>
+          </a:xfrm>
+          <a:prstGeom prst="straightConnector1">
+            <a:avLst/>
+          </a:prstGeom>
+          <a:ln w="38100">
+            <a:tailEnd type="triangle"/>
+          </a:ln>
+        </p:spPr>
+        <p:style>
+          <a:lnRef idx="1">
+            <a:schemeClr val="accent1"/>
+          </a:lnRef>
+          <a:fillRef idx="0">
+            <a:schemeClr val="accent1"/>
+          </a:fillRef>
+          <a:effectRef idx="0">
+            <a:schemeClr val="accent1"/>
+          </a:effectRef>
+          <a:fontRef idx="minor">
+            <a:schemeClr val="tx1"/>
+          </a:fontRef>
+        </p:style>
+      </p:cxnSp>
+      <p:sp>
+        <p:nvSpPr>
+          <p:cNvPr id="7" name="Rectangle 6"/>
+          <p:cNvSpPr/>
+          <p:nvPr/>
+        </p:nvSpPr>
+        <p:spPr>
+          <a:xfrm>
+            <a:off x="688931" y="4384110"/>
+            <a:ext cx="1590805" cy="601249"/>
+          </a:xfrm>
+          <a:prstGeom prst="rect">
+            <a:avLst/>
+          </a:prstGeom>
+        </p:spPr>
+        <p:style>
+          <a:lnRef idx="2">
+            <a:schemeClr val="accent1">
+              <a:shade val="50000"/>
+            </a:schemeClr>
+          </a:lnRef>
+          <a:fillRef idx="1">
+            <a:schemeClr val="accent1"/>
+          </a:fillRef>
+          <a:effectRef idx="0">
+            <a:schemeClr val="accent1"/>
+          </a:effectRef>
+          <a:fontRef idx="minor">
+            <a:schemeClr val="lt1"/>
+          </a:fontRef>
+        </p:style>
+        <p:txBody>
+          <a:bodyPr rtlCol="0" anchor="ctr"/>
+          <a:lstStyle/>
+          <a:p>
+            <a:pPr algn="ctr"/>
+            <a:r>
+              <a:rPr lang="en-US" sz="1400" dirty="0" smtClean="0"/>
+              <a:t>1.oInput.fireLiveChange</a:t>
+            </a:r>
+            <a:r>
+              <a:rPr lang="en-US" sz="1400" dirty="0"/>
+              <a:t>("f");</a:t>
+            </a:r>
+            <a:endParaRPr lang="en-US" sz="1400" dirty="0"/>
+          </a:p>
+        </p:txBody>
+      </p:sp>
+      <p:sp>
+        <p:nvSpPr>
+          <p:cNvPr id="8" name="Rectangle 7"/>
+          <p:cNvSpPr/>
+          <p:nvPr/>
+        </p:nvSpPr>
+        <p:spPr>
+          <a:xfrm>
+            <a:off x="2417523" y="4384110"/>
+            <a:ext cx="2154477" cy="601249"/>
+          </a:xfrm>
+          <a:prstGeom prst="rect">
+            <a:avLst/>
+          </a:prstGeom>
+          <a:solidFill>
+            <a:schemeClr val="accent6">
+              <a:lumMod val="60000"/>
+              <a:lumOff val="40000"/>
+            </a:schemeClr>
+          </a:solidFill>
+        </p:spPr>
+        <p:style>
+          <a:lnRef idx="2">
+            <a:schemeClr val="accent1">
+              <a:shade val="50000"/>
+            </a:schemeClr>
+          </a:lnRef>
+          <a:fillRef idx="1">
+            <a:schemeClr val="accent1"/>
+          </a:fillRef>
+          <a:effectRef idx="0">
+            <a:schemeClr val="accent1"/>
+          </a:effectRef>
+          <a:fontRef idx="minor">
+            <a:schemeClr val="lt1"/>
+          </a:fontRef>
+        </p:style>
+        <p:txBody>
+          <a:bodyPr rtlCol="0" anchor="ctr"/>
+          <a:lstStyle/>
+          <a:p>
+            <a:pPr algn="ctr"/>
+            <a:r>
+              <a:rPr lang="en-US" sz="1400" dirty="0" smtClean="0"/>
+              <a:t>2. </a:t>
+            </a:r>
+            <a:r>
+              <a:rPr lang="en-US" sz="1400" dirty="0" err="1" smtClean="0"/>
+              <a:t>this.oModel.read</a:t>
+            </a:r>
+            <a:r>
+              <a:rPr lang="en-US" sz="1400" dirty="0"/>
+              <a:t>("/" + </a:t>
+            </a:r>
+            <a:r>
+              <a:rPr lang="en-US" sz="1400" dirty="0" err="1"/>
+              <a:t>sEndPoint</a:t>
+            </a:r>
+            <a:r>
+              <a:rPr lang="en-US" sz="1400" dirty="0"/>
+              <a:t>, null, true)</a:t>
+            </a:r>
+            <a:endParaRPr lang="en-US" sz="1400" dirty="0"/>
+          </a:p>
+        </p:txBody>
+      </p:sp>
+      <p:sp>
+        <p:nvSpPr>
+          <p:cNvPr id="9" name="Rectangle 8"/>
+          <p:cNvSpPr/>
+          <p:nvPr/>
+        </p:nvSpPr>
+        <p:spPr>
+          <a:xfrm>
+            <a:off x="4759890" y="4384110"/>
+            <a:ext cx="1903957" cy="601249"/>
+          </a:xfrm>
+          <a:prstGeom prst="rect">
+            <a:avLst/>
+          </a:prstGeom>
+        </p:spPr>
+        <p:style>
+          <a:lnRef idx="2">
+            <a:schemeClr val="accent1">
+              <a:shade val="50000"/>
+            </a:schemeClr>
+          </a:lnRef>
+          <a:fillRef idx="1">
+            <a:schemeClr val="accent1"/>
+          </a:fillRef>
+          <a:effectRef idx="0">
+            <a:schemeClr val="accent1"/>
+          </a:effectRef>
+          <a:fontRef idx="minor">
+            <a:schemeClr val="lt1"/>
+          </a:fontRef>
+        </p:style>
+        <p:txBody>
+          <a:bodyPr rtlCol="0" anchor="ctr"/>
+          <a:lstStyle/>
+          <a:p>
+            <a:pPr algn="ctr"/>
+            <a:r>
+              <a:rPr lang="en-US" sz="1400" dirty="0" smtClean="0"/>
+              <a:t>3. Items = </a:t>
+            </a:r>
+            <a:r>
+              <a:rPr lang="en-US" sz="1400" dirty="0" err="1" smtClean="0"/>
+              <a:t>oInput.getSuggestionItems</a:t>
+            </a:r>
+            <a:r>
+              <a:rPr lang="en-US" sz="1400" dirty="0" smtClean="0"/>
+              <a:t>()</a:t>
+            </a:r>
+            <a:endParaRPr lang="en-US" sz="1400" dirty="0"/>
+          </a:p>
+        </p:txBody>
+      </p:sp>
+      <p:sp>
+        <p:nvSpPr>
+          <p:cNvPr id="10" name="Rectangle 9"/>
+          <p:cNvSpPr/>
+          <p:nvPr/>
+        </p:nvSpPr>
+        <p:spPr>
+          <a:xfrm>
+            <a:off x="6889315" y="4384110"/>
+            <a:ext cx="1528175" cy="601249"/>
+          </a:xfrm>
+          <a:prstGeom prst="rect">
+            <a:avLst/>
+          </a:prstGeom>
+        </p:spPr>
+        <p:style>
+          <a:lnRef idx="2">
+            <a:schemeClr val="accent1">
+              <a:shade val="50000"/>
+            </a:schemeClr>
+          </a:lnRef>
+          <a:fillRef idx="1">
+            <a:schemeClr val="accent1"/>
+          </a:fillRef>
+          <a:effectRef idx="0">
+            <a:schemeClr val="accent1"/>
+          </a:effectRef>
+          <a:fontRef idx="minor">
+            <a:schemeClr val="lt1"/>
+          </a:fontRef>
+        </p:style>
+        <p:txBody>
+          <a:bodyPr rtlCol="0" anchor="ctr"/>
+          <a:lstStyle/>
+          <a:p>
+            <a:pPr algn="ctr"/>
+            <a:r>
+              <a:rPr lang="en-US" sz="1400" dirty="0" smtClean="0"/>
+              <a:t>4. items[0</a:t>
+            </a:r>
+            <a:r>
+              <a:rPr lang="en-US" sz="1400" dirty="0"/>
+              <a:t>].</a:t>
+            </a:r>
+            <a:r>
+              <a:rPr lang="en-US" sz="1400" dirty="0" err="1"/>
+              <a:t>getText</a:t>
+            </a:r>
+            <a:r>
+              <a:rPr lang="en-US" sz="1400" dirty="0"/>
+              <a:t>();</a:t>
+            </a:r>
+          </a:p>
+        </p:txBody>
+      </p:sp>
+      <p:sp>
+        <p:nvSpPr>
+          <p:cNvPr id="12" name="Rectangle 11"/>
+          <p:cNvSpPr/>
+          <p:nvPr/>
+        </p:nvSpPr>
+        <p:spPr>
+          <a:xfrm>
+            <a:off x="8642958" y="3432131"/>
+            <a:ext cx="2242159" cy="626302"/>
+          </a:xfrm>
+          <a:prstGeom prst="rect">
+            <a:avLst/>
+          </a:prstGeom>
+          <a:solidFill>
+            <a:schemeClr val="accent6">
+              <a:lumMod val="40000"/>
+              <a:lumOff val="60000"/>
+            </a:schemeClr>
+          </a:solidFill>
+        </p:spPr>
+        <p:style>
+          <a:lnRef idx="2">
+            <a:schemeClr val="accent1">
+              <a:shade val="50000"/>
+            </a:schemeClr>
+          </a:lnRef>
+          <a:fillRef idx="1">
+            <a:schemeClr val="accent1"/>
+          </a:fillRef>
+          <a:effectRef idx="0">
+            <a:schemeClr val="accent1"/>
+          </a:effectRef>
+          <a:fontRef idx="minor">
+            <a:schemeClr val="lt1"/>
+          </a:fontRef>
+        </p:style>
+        <p:txBody>
+          <a:bodyPr rtlCol="0" anchor="ctr"/>
+          <a:lstStyle/>
+          <a:p>
+            <a:pPr algn="ctr"/>
+            <a:r>
+              <a:rPr lang="en-US" dirty="0" smtClean="0"/>
+              <a:t>5. Success callback of </a:t>
+            </a:r>
+            <a:r>
+              <a:rPr lang="en-US" dirty="0" err="1" smtClean="0"/>
+              <a:t>this.oModel.read</a:t>
+            </a:r>
+            <a:endParaRPr lang="en-US" dirty="0"/>
+          </a:p>
+        </p:txBody>
+      </p:sp>
+      <p:sp>
+        <p:nvSpPr>
+          <p:cNvPr id="13" name="TextBox 12"/>
+          <p:cNvSpPr txBox="1"/>
+          <p:nvPr/>
+        </p:nvSpPr>
+        <p:spPr>
+          <a:xfrm>
+            <a:off x="10647123" y="5239103"/>
+            <a:ext cx="1077239" cy="369332"/>
+          </a:xfrm>
+          <a:prstGeom prst="rect">
+            <a:avLst/>
+          </a:prstGeom>
+          <a:noFill/>
+        </p:spPr>
+        <p:txBody>
+          <a:bodyPr wrap="square" rtlCol="0">
+            <a:spAutoFit/>
+          </a:bodyPr>
+          <a:lstStyle/>
+          <a:p>
+            <a:r>
+              <a:rPr lang="en-US" b="1" dirty="0" smtClean="0"/>
+              <a:t>time</a:t>
+            </a:r>
+            <a:endParaRPr lang="en-US" b="1" dirty="0"/>
+          </a:p>
+        </p:txBody>
+      </p:sp>
+      <p:sp>
+        <p:nvSpPr>
+          <p:cNvPr id="14" name="TextBox 13"/>
+          <p:cNvSpPr txBox="1"/>
+          <p:nvPr/>
+        </p:nvSpPr>
+        <p:spPr>
+          <a:xfrm>
+            <a:off x="438411" y="826718"/>
+            <a:ext cx="1215025" cy="369332"/>
+          </a:xfrm>
+          <a:prstGeom prst="rect">
+            <a:avLst/>
+          </a:prstGeom>
+          <a:noFill/>
+        </p:spPr>
+        <p:txBody>
+          <a:bodyPr wrap="square" rtlCol="0">
+            <a:spAutoFit/>
+          </a:bodyPr>
+          <a:lstStyle/>
+          <a:p>
+            <a:r>
+              <a:rPr lang="en-US" b="1" dirty="0" smtClean="0"/>
+              <a:t>Event</a:t>
+            </a:r>
+            <a:endParaRPr lang="en-US" b="1" dirty="0"/>
+          </a:p>
+        </p:txBody>
+      </p:sp>
+      <p:cxnSp>
+        <p:nvCxnSpPr>
+          <p:cNvPr id="16" name="Straight Connector 15"/>
+          <p:cNvCxnSpPr/>
+          <p:nvPr/>
+        </p:nvCxnSpPr>
+        <p:spPr>
+          <a:xfrm>
+            <a:off x="6663847" y="3432131"/>
+            <a:ext cx="0" cy="2016690"/>
+          </a:xfrm>
+          <a:prstGeom prst="line">
+            <a:avLst/>
+          </a:prstGeom>
+          <a:ln w="38100">
+            <a:prstDash val="dash"/>
+          </a:ln>
+        </p:spPr>
+        <p:style>
+          <a:lnRef idx="1">
+            <a:schemeClr val="accent1"/>
+          </a:lnRef>
+          <a:fillRef idx="0">
+            <a:schemeClr val="accent1"/>
+          </a:fillRef>
+          <a:effectRef idx="0">
+            <a:schemeClr val="accent1"/>
+          </a:effectRef>
+          <a:fontRef idx="minor">
+            <a:schemeClr val="tx1"/>
+          </a:fontRef>
+        </p:style>
+      </p:cxnSp>
+      <p:cxnSp>
+        <p:nvCxnSpPr>
+          <p:cNvPr id="18" name="Straight Connector 17"/>
+          <p:cNvCxnSpPr/>
+          <p:nvPr/>
+        </p:nvCxnSpPr>
+        <p:spPr>
+          <a:xfrm>
+            <a:off x="8642958" y="3434219"/>
+            <a:ext cx="0" cy="2014602"/>
+          </a:xfrm>
+          <a:prstGeom prst="line">
+            <a:avLst/>
+          </a:prstGeom>
+          <a:ln w="38100">
+            <a:prstDash val="dash"/>
+          </a:ln>
+        </p:spPr>
+        <p:style>
+          <a:lnRef idx="1">
+            <a:schemeClr val="accent1"/>
+          </a:lnRef>
+          <a:fillRef idx="0">
+            <a:schemeClr val="accent1"/>
+          </a:fillRef>
+          <a:effectRef idx="0">
+            <a:schemeClr val="accent1"/>
+          </a:effectRef>
+          <a:fontRef idx="minor">
+            <a:schemeClr val="tx1"/>
+          </a:fontRef>
+        </p:style>
+      </p:cxnSp>
+      <p:sp>
+        <p:nvSpPr>
+          <p:cNvPr id="21" name="TextBox 20"/>
+          <p:cNvSpPr txBox="1"/>
+          <p:nvPr/>
+        </p:nvSpPr>
+        <p:spPr>
+          <a:xfrm>
+            <a:off x="6475956" y="5448821"/>
+            <a:ext cx="413359" cy="369332"/>
+          </a:xfrm>
+          <a:prstGeom prst="rect">
+            <a:avLst/>
+          </a:prstGeom>
+          <a:noFill/>
+        </p:spPr>
+        <p:txBody>
+          <a:bodyPr wrap="square" rtlCol="0">
+            <a:spAutoFit/>
+          </a:bodyPr>
+          <a:lstStyle/>
+          <a:p>
+            <a:r>
+              <a:rPr lang="en-US" b="1" dirty="0" smtClean="0"/>
+              <a:t>t1</a:t>
+            </a:r>
+            <a:endParaRPr lang="en-US" b="1" dirty="0"/>
+          </a:p>
+        </p:txBody>
+      </p:sp>
+      <p:sp>
+        <p:nvSpPr>
+          <p:cNvPr id="22" name="TextBox 21"/>
+          <p:cNvSpPr txBox="1"/>
+          <p:nvPr/>
+        </p:nvSpPr>
+        <p:spPr>
+          <a:xfrm>
+            <a:off x="8417490" y="5448821"/>
+            <a:ext cx="613776" cy="369332"/>
+          </a:xfrm>
+          <a:prstGeom prst="rect">
+            <a:avLst/>
+          </a:prstGeom>
+          <a:noFill/>
+        </p:spPr>
+        <p:txBody>
+          <a:bodyPr wrap="square" rtlCol="0">
+            <a:spAutoFit/>
+          </a:bodyPr>
+          <a:lstStyle/>
+          <a:p>
+            <a:r>
+              <a:rPr lang="en-US" b="1" dirty="0" smtClean="0"/>
+              <a:t>t2</a:t>
+            </a:r>
+            <a:endParaRPr lang="en-US" b="1" dirty="0"/>
+          </a:p>
+        </p:txBody>
+      </p:sp>
+      <p:sp>
+        <p:nvSpPr>
+          <p:cNvPr id="23" name="Rectangle 22"/>
+          <p:cNvSpPr/>
+          <p:nvPr/>
+        </p:nvSpPr>
+        <p:spPr>
+          <a:xfrm>
+            <a:off x="2843407" y="826718"/>
+            <a:ext cx="1302707" cy="520016"/>
+          </a:xfrm>
+          <a:prstGeom prst="rect">
+            <a:avLst/>
+          </a:prstGeom>
+        </p:spPr>
+        <p:style>
+          <a:lnRef idx="2">
+            <a:schemeClr val="accent1">
+              <a:shade val="50000"/>
+            </a:schemeClr>
+          </a:lnRef>
+          <a:fillRef idx="1">
+            <a:schemeClr val="accent1"/>
+          </a:fillRef>
+          <a:effectRef idx="0">
+            <a:schemeClr val="accent1"/>
+          </a:effectRef>
+          <a:fontRef idx="minor">
+            <a:schemeClr val="lt1"/>
+          </a:fontRef>
+        </p:style>
+        <p:txBody>
+          <a:bodyPr rtlCol="0" anchor="ctr"/>
+          <a:lstStyle/>
+          <a:p>
+            <a:pPr algn="ctr"/>
+            <a:r>
+              <a:rPr lang="en-US" b="1" dirty="0" smtClean="0"/>
+              <a:t>OPA test code</a:t>
+            </a:r>
+            <a:endParaRPr lang="en-US" b="1" dirty="0"/>
+          </a:p>
+        </p:txBody>
+      </p:sp>
+      <p:sp>
+        <p:nvSpPr>
+          <p:cNvPr id="24" name="Rectangle 23"/>
+          <p:cNvSpPr/>
+          <p:nvPr/>
+        </p:nvSpPr>
+        <p:spPr>
+          <a:xfrm>
+            <a:off x="4365320" y="833167"/>
+            <a:ext cx="1302707" cy="520016"/>
+          </a:xfrm>
+          <a:prstGeom prst="rect">
+            <a:avLst/>
+          </a:prstGeom>
+          <a:solidFill>
+            <a:schemeClr val="accent6">
+              <a:lumMod val="40000"/>
+              <a:lumOff val="60000"/>
+            </a:schemeClr>
+          </a:solidFill>
+        </p:spPr>
+        <p:style>
+          <a:lnRef idx="2">
+            <a:schemeClr val="accent1">
+              <a:shade val="50000"/>
+            </a:schemeClr>
+          </a:lnRef>
+          <a:fillRef idx="1">
+            <a:schemeClr val="accent1"/>
+          </a:fillRef>
+          <a:effectRef idx="0">
+            <a:schemeClr val="accent1"/>
+          </a:effectRef>
+          <a:fontRef idx="minor">
+            <a:schemeClr val="lt1"/>
+          </a:fontRef>
+        </p:style>
+        <p:txBody>
+          <a:bodyPr rtlCol="0" anchor="ctr"/>
+          <a:lstStyle/>
+          <a:p>
+            <a:pPr algn="ctr"/>
+            <a:r>
+              <a:rPr lang="en-US" b="1" dirty="0" smtClean="0"/>
+              <a:t>My Lead Code</a:t>
+            </a:r>
+            <a:endParaRPr lang="en-US" b="1" dirty="0"/>
+          </a:p>
+        </p:txBody>
+      </p:sp>
+    </p:spTree>
+    <p:extLst>
+      <p:ext uri="{BB962C8B-B14F-4D97-AF65-F5344CB8AC3E}">
+        <p14:creationId xmlns:p14="http://schemas.microsoft.com/office/powerpoint/2010/main" val="1016412728"/>
+      </p:ext>
+    </p:extLst>
+  </p:cSld>
+  <p:clrMapOvr>
+    <a:masterClrMapping/>
+  </p:clrMapOvr>
+  <p:timing>
+    <p:tnLst>
+      <p:par>
+        <p:cTn id="1" dur="indefinite" restart="never" nodeType="tmRoot"/>
+      </p:par>
+    </p:tnLst>
+  </p:timing>
+</p:sld>
+</file>
+
+<file path=ppt/slides/slide29.xml><?xml version="1.0" encoding="utf-8"?>
+<p:sld xmlns:a="http://schemas.openxmlformats.org/drawingml/2006/main" xmlns:r="http://schemas.openxmlformats.org/officeDocument/2006/relationships" xmlns:p="http://schemas.openxmlformats.org/presentationml/2006/main">
+  <p:cSld>
+    <p:spTree>
+      <p:nvGrpSpPr>
+        <p:cNvPr id="1" name=""/>
+        <p:cNvGrpSpPr/>
+        <p:nvPr/>
+      </p:nvGrpSpPr>
+      <p:grpSpPr>
+        <a:xfrm>
+          <a:off x="0" y="0"/>
+          <a:ext cx="0" cy="0"/>
+          <a:chOff x="0" y="0"/>
+          <a:chExt cx="0" cy="0"/>
+        </a:xfrm>
+      </p:grpSpPr>
+      <p:cxnSp>
+        <p:nvCxnSpPr>
+          <p:cNvPr id="4" name="Straight Arrow Connector 3"/>
+          <p:cNvCxnSpPr/>
+          <p:nvPr/>
+        </p:nvCxnSpPr>
+        <p:spPr>
+          <a:xfrm>
+            <a:off x="688932" y="5423769"/>
+            <a:ext cx="10521857" cy="44026"/>
+          </a:xfrm>
+          <a:prstGeom prst="straightConnector1">
+            <a:avLst/>
+          </a:prstGeom>
+          <a:ln w="38100">
+            <a:tailEnd type="triangle"/>
+          </a:ln>
+        </p:spPr>
+        <p:style>
+          <a:lnRef idx="1">
+            <a:schemeClr val="accent1"/>
+          </a:lnRef>
+          <a:fillRef idx="0">
+            <a:schemeClr val="accent1"/>
+          </a:fillRef>
+          <a:effectRef idx="0">
+            <a:schemeClr val="accent1"/>
+          </a:effectRef>
+          <a:fontRef idx="minor">
+            <a:schemeClr val="tx1"/>
+          </a:fontRef>
+        </p:style>
+      </p:cxnSp>
+      <p:cxnSp>
+        <p:nvCxnSpPr>
+          <p:cNvPr id="6" name="Straight Arrow Connector 5"/>
+          <p:cNvCxnSpPr/>
+          <p:nvPr/>
+        </p:nvCxnSpPr>
+        <p:spPr>
+          <a:xfrm flipV="1">
+            <a:off x="688932" y="1215024"/>
+            <a:ext cx="0" cy="4233797"/>
+          </a:xfrm>
+          <a:prstGeom prst="straightConnector1">
+            <a:avLst/>
+          </a:prstGeom>
+          <a:ln w="38100">
+            <a:tailEnd type="triangle"/>
+          </a:ln>
+        </p:spPr>
+        <p:style>
+          <a:lnRef idx="1">
+            <a:schemeClr val="accent1"/>
+          </a:lnRef>
+          <a:fillRef idx="0">
+            <a:schemeClr val="accent1"/>
+          </a:fillRef>
+          <a:effectRef idx="0">
+            <a:schemeClr val="accent1"/>
+          </a:effectRef>
+          <a:fontRef idx="minor">
+            <a:schemeClr val="tx1"/>
+          </a:fontRef>
+        </p:style>
+      </p:cxnSp>
+      <p:sp>
+        <p:nvSpPr>
+          <p:cNvPr id="7" name="Rectangle 6"/>
+          <p:cNvSpPr/>
+          <p:nvPr/>
+        </p:nvSpPr>
+        <p:spPr>
+          <a:xfrm>
+            <a:off x="688931" y="4384110"/>
+            <a:ext cx="1590805" cy="601249"/>
+          </a:xfrm>
+          <a:prstGeom prst="rect">
+            <a:avLst/>
+          </a:prstGeom>
+        </p:spPr>
+        <p:style>
+          <a:lnRef idx="2">
+            <a:schemeClr val="accent1">
+              <a:shade val="50000"/>
+            </a:schemeClr>
+          </a:lnRef>
+          <a:fillRef idx="1">
+            <a:schemeClr val="accent1"/>
+          </a:fillRef>
+          <a:effectRef idx="0">
+            <a:schemeClr val="accent1"/>
+          </a:effectRef>
+          <a:fontRef idx="minor">
+            <a:schemeClr val="lt1"/>
+          </a:fontRef>
+        </p:style>
+        <p:txBody>
+          <a:bodyPr rtlCol="0" anchor="ctr"/>
+          <a:lstStyle/>
+          <a:p>
+            <a:pPr algn="ctr"/>
+            <a:r>
+              <a:rPr lang="en-US" sz="1400" dirty="0" smtClean="0"/>
+              <a:t>1.oInput.fireLiveChange</a:t>
+            </a:r>
+            <a:r>
+              <a:rPr lang="en-US" sz="1400" dirty="0"/>
+              <a:t>("f");</a:t>
+            </a:r>
+            <a:endParaRPr lang="en-US" sz="1400" dirty="0"/>
+          </a:p>
+        </p:txBody>
+      </p:sp>
+      <p:sp>
+        <p:nvSpPr>
+          <p:cNvPr id="8" name="Rectangle 7"/>
+          <p:cNvSpPr/>
+          <p:nvPr/>
+        </p:nvSpPr>
+        <p:spPr>
+          <a:xfrm>
+            <a:off x="2417523" y="4384110"/>
+            <a:ext cx="1947797" cy="601249"/>
+          </a:xfrm>
+          <a:prstGeom prst="rect">
+            <a:avLst/>
+          </a:prstGeom>
+          <a:solidFill>
+            <a:schemeClr val="accent6">
+              <a:lumMod val="60000"/>
+              <a:lumOff val="40000"/>
+            </a:schemeClr>
+          </a:solidFill>
+        </p:spPr>
+        <p:style>
+          <a:lnRef idx="2">
+            <a:schemeClr val="accent1">
+              <a:shade val="50000"/>
+            </a:schemeClr>
+          </a:lnRef>
+          <a:fillRef idx="1">
+            <a:schemeClr val="accent1"/>
+          </a:fillRef>
+          <a:effectRef idx="0">
+            <a:schemeClr val="accent1"/>
+          </a:effectRef>
+          <a:fontRef idx="minor">
+            <a:schemeClr val="lt1"/>
+          </a:fontRef>
+        </p:style>
+        <p:txBody>
+          <a:bodyPr rtlCol="0" anchor="ctr"/>
+          <a:lstStyle/>
+          <a:p>
+            <a:pPr algn="ctr"/>
+            <a:r>
+              <a:rPr lang="en-US" sz="1400" dirty="0" smtClean="0"/>
+              <a:t>2. </a:t>
+            </a:r>
+            <a:r>
+              <a:rPr lang="en-US" sz="1400" dirty="0" err="1" smtClean="0"/>
+              <a:t>this.oModel.read</a:t>
+            </a:r>
+            <a:r>
+              <a:rPr lang="en-US" sz="1400" dirty="0"/>
+              <a:t>("/" + </a:t>
+            </a:r>
+            <a:r>
+              <a:rPr lang="en-US" sz="1400" dirty="0" err="1"/>
+              <a:t>sEndPoint</a:t>
+            </a:r>
+            <a:r>
+              <a:rPr lang="en-US" sz="1400" dirty="0"/>
+              <a:t>, null, true)</a:t>
+            </a:r>
+            <a:endParaRPr lang="en-US" sz="1400" dirty="0"/>
+          </a:p>
+        </p:txBody>
+      </p:sp>
+      <p:sp>
+        <p:nvSpPr>
+          <p:cNvPr id="9" name="Rectangle 8"/>
+          <p:cNvSpPr/>
+          <p:nvPr/>
+        </p:nvSpPr>
+        <p:spPr>
+          <a:xfrm>
+            <a:off x="6701427" y="4321664"/>
+            <a:ext cx="1903957" cy="601249"/>
+          </a:xfrm>
+          <a:prstGeom prst="rect">
+            <a:avLst/>
+          </a:prstGeom>
+        </p:spPr>
+        <p:style>
+          <a:lnRef idx="2">
+            <a:schemeClr val="accent1">
+              <a:shade val="50000"/>
+            </a:schemeClr>
+          </a:lnRef>
+          <a:fillRef idx="1">
+            <a:schemeClr val="accent1"/>
+          </a:fillRef>
+          <a:effectRef idx="0">
+            <a:schemeClr val="accent1"/>
+          </a:effectRef>
+          <a:fontRef idx="minor">
+            <a:schemeClr val="lt1"/>
+          </a:fontRef>
+        </p:style>
+        <p:txBody>
+          <a:bodyPr rtlCol="0" anchor="ctr"/>
+          <a:lstStyle/>
+          <a:p>
+            <a:pPr algn="ctr"/>
+            <a:r>
+              <a:rPr lang="en-US" sz="1400" dirty="0"/>
+              <a:t>4</a:t>
+            </a:r>
+            <a:r>
+              <a:rPr lang="en-US" sz="1400" dirty="0" smtClean="0"/>
+              <a:t>. Items = </a:t>
+            </a:r>
+            <a:r>
+              <a:rPr lang="en-US" sz="1400" dirty="0" err="1" smtClean="0"/>
+              <a:t>oInput.getSuggestionItems</a:t>
+            </a:r>
+            <a:r>
+              <a:rPr lang="en-US" sz="1400" dirty="0" smtClean="0"/>
+              <a:t>()</a:t>
+            </a:r>
+            <a:endParaRPr lang="en-US" sz="1400" dirty="0"/>
+          </a:p>
+        </p:txBody>
+      </p:sp>
+      <p:sp>
+        <p:nvSpPr>
+          <p:cNvPr id="10" name="Rectangle 9"/>
+          <p:cNvSpPr/>
+          <p:nvPr/>
+        </p:nvSpPr>
+        <p:spPr>
+          <a:xfrm>
+            <a:off x="8943582" y="4302691"/>
+            <a:ext cx="1528175" cy="601249"/>
+          </a:xfrm>
+          <a:prstGeom prst="rect">
+            <a:avLst/>
+          </a:prstGeom>
+        </p:spPr>
+        <p:style>
+          <a:lnRef idx="2">
+            <a:schemeClr val="accent1">
+              <a:shade val="50000"/>
+            </a:schemeClr>
+          </a:lnRef>
+          <a:fillRef idx="1">
+            <a:schemeClr val="accent1"/>
+          </a:fillRef>
+          <a:effectRef idx="0">
+            <a:schemeClr val="accent1"/>
+          </a:effectRef>
+          <a:fontRef idx="minor">
+            <a:schemeClr val="lt1"/>
+          </a:fontRef>
+        </p:style>
+        <p:txBody>
+          <a:bodyPr rtlCol="0" anchor="ctr"/>
+          <a:lstStyle/>
+          <a:p>
+            <a:pPr algn="ctr"/>
+            <a:r>
+              <a:rPr lang="en-US" sz="1400" dirty="0"/>
+              <a:t>5</a:t>
+            </a:r>
+            <a:r>
+              <a:rPr lang="en-US" sz="1400" dirty="0" smtClean="0"/>
+              <a:t>. items[0</a:t>
+            </a:r>
+            <a:r>
+              <a:rPr lang="en-US" sz="1400" dirty="0"/>
+              <a:t>].</a:t>
+            </a:r>
+            <a:r>
+              <a:rPr lang="en-US" sz="1400" dirty="0" err="1"/>
+              <a:t>getText</a:t>
+            </a:r>
+            <a:r>
+              <a:rPr lang="en-US" sz="1400" dirty="0"/>
+              <a:t>();</a:t>
+            </a:r>
+          </a:p>
+        </p:txBody>
+      </p:sp>
+      <p:sp>
+        <p:nvSpPr>
+          <p:cNvPr id="12" name="Rectangle 11"/>
+          <p:cNvSpPr/>
+          <p:nvPr/>
+        </p:nvSpPr>
+        <p:spPr>
+          <a:xfrm>
+            <a:off x="5054253" y="2762174"/>
+            <a:ext cx="2242159" cy="626302"/>
+          </a:xfrm>
+          <a:prstGeom prst="rect">
+            <a:avLst/>
+          </a:prstGeom>
+          <a:solidFill>
+            <a:schemeClr val="accent6">
+              <a:lumMod val="40000"/>
+              <a:lumOff val="60000"/>
+            </a:schemeClr>
+          </a:solidFill>
+        </p:spPr>
+        <p:style>
+          <a:lnRef idx="2">
+            <a:schemeClr val="accent1">
+              <a:shade val="50000"/>
+            </a:schemeClr>
+          </a:lnRef>
+          <a:fillRef idx="1">
+            <a:schemeClr val="accent1"/>
+          </a:fillRef>
+          <a:effectRef idx="0">
+            <a:schemeClr val="accent1"/>
+          </a:effectRef>
+          <a:fontRef idx="minor">
+            <a:schemeClr val="lt1"/>
+          </a:fontRef>
+        </p:style>
+        <p:txBody>
+          <a:bodyPr rtlCol="0" anchor="ctr"/>
+          <a:lstStyle/>
+          <a:p>
+            <a:pPr algn="ctr"/>
+            <a:r>
+              <a:rPr lang="en-US" dirty="0"/>
+              <a:t>3</a:t>
+            </a:r>
+            <a:r>
+              <a:rPr lang="en-US" dirty="0" smtClean="0"/>
+              <a:t>. Success callback of </a:t>
+            </a:r>
+            <a:r>
+              <a:rPr lang="en-US" dirty="0" err="1" smtClean="0"/>
+              <a:t>this.oModel.read</a:t>
+            </a:r>
+            <a:endParaRPr lang="en-US" dirty="0"/>
+          </a:p>
+        </p:txBody>
+      </p:sp>
+      <p:sp>
+        <p:nvSpPr>
+          <p:cNvPr id="13" name="TextBox 12"/>
+          <p:cNvSpPr txBox="1"/>
+          <p:nvPr/>
+        </p:nvSpPr>
+        <p:spPr>
+          <a:xfrm>
+            <a:off x="11248375" y="5283129"/>
+            <a:ext cx="1077239" cy="369332"/>
+          </a:xfrm>
+          <a:prstGeom prst="rect">
+            <a:avLst/>
+          </a:prstGeom>
+          <a:noFill/>
+        </p:spPr>
+        <p:txBody>
+          <a:bodyPr wrap="square" rtlCol="0">
+            <a:spAutoFit/>
+          </a:bodyPr>
+          <a:lstStyle/>
+          <a:p>
+            <a:r>
+              <a:rPr lang="en-US" b="1" dirty="0" smtClean="0"/>
+              <a:t>time</a:t>
+            </a:r>
+            <a:endParaRPr lang="en-US" b="1" dirty="0"/>
+          </a:p>
+        </p:txBody>
+      </p:sp>
+      <p:sp>
+        <p:nvSpPr>
+          <p:cNvPr id="14" name="TextBox 13"/>
+          <p:cNvSpPr txBox="1"/>
+          <p:nvPr/>
+        </p:nvSpPr>
+        <p:spPr>
+          <a:xfrm>
+            <a:off x="438411" y="826718"/>
+            <a:ext cx="1215025" cy="369332"/>
+          </a:xfrm>
+          <a:prstGeom prst="rect">
+            <a:avLst/>
+          </a:prstGeom>
+          <a:noFill/>
+        </p:spPr>
+        <p:txBody>
+          <a:bodyPr wrap="square" rtlCol="0">
+            <a:spAutoFit/>
+          </a:bodyPr>
+          <a:lstStyle/>
+          <a:p>
+            <a:r>
+              <a:rPr lang="en-US" b="1" dirty="0" smtClean="0"/>
+              <a:t>Event</a:t>
+            </a:r>
+            <a:endParaRPr lang="en-US" b="1" dirty="0"/>
+          </a:p>
+        </p:txBody>
+      </p:sp>
+      <p:cxnSp>
+        <p:nvCxnSpPr>
+          <p:cNvPr id="16" name="Straight Connector 15"/>
+          <p:cNvCxnSpPr/>
+          <p:nvPr/>
+        </p:nvCxnSpPr>
+        <p:spPr>
+          <a:xfrm>
+            <a:off x="5054253" y="3388289"/>
+            <a:ext cx="0" cy="2057493"/>
+          </a:xfrm>
+          <a:prstGeom prst="line">
+            <a:avLst/>
+          </a:prstGeom>
+          <a:ln w="38100">
+            <a:prstDash val="dash"/>
+          </a:ln>
+        </p:spPr>
+        <p:style>
+          <a:lnRef idx="1">
+            <a:schemeClr val="accent1"/>
+          </a:lnRef>
+          <a:fillRef idx="0">
+            <a:schemeClr val="accent1"/>
+          </a:fillRef>
+          <a:effectRef idx="0">
+            <a:schemeClr val="accent1"/>
+          </a:effectRef>
+          <a:fontRef idx="minor">
+            <a:schemeClr val="tx1"/>
+          </a:fontRef>
+        </p:style>
+      </p:cxnSp>
+      <p:cxnSp>
+        <p:nvCxnSpPr>
+          <p:cNvPr id="18" name="Straight Connector 17"/>
+          <p:cNvCxnSpPr/>
+          <p:nvPr/>
+        </p:nvCxnSpPr>
+        <p:spPr>
+          <a:xfrm>
+            <a:off x="6701423" y="3557577"/>
+            <a:ext cx="12525" cy="1910218"/>
+          </a:xfrm>
+          <a:prstGeom prst="line">
+            <a:avLst/>
+          </a:prstGeom>
+          <a:ln w="38100">
+            <a:prstDash val="dash"/>
+          </a:ln>
+        </p:spPr>
+        <p:style>
+          <a:lnRef idx="1">
+            <a:schemeClr val="accent1"/>
+          </a:lnRef>
+          <a:fillRef idx="0">
+            <a:schemeClr val="accent1"/>
+          </a:fillRef>
+          <a:effectRef idx="0">
+            <a:schemeClr val="accent1"/>
+          </a:effectRef>
+          <a:fontRef idx="minor">
+            <a:schemeClr val="tx1"/>
+          </a:fontRef>
+        </p:style>
+      </p:cxnSp>
+      <p:sp>
+        <p:nvSpPr>
+          <p:cNvPr id="21" name="TextBox 20"/>
+          <p:cNvSpPr txBox="1"/>
+          <p:nvPr/>
+        </p:nvSpPr>
+        <p:spPr>
+          <a:xfrm>
+            <a:off x="4860092" y="5410867"/>
+            <a:ext cx="413359" cy="369332"/>
+          </a:xfrm>
+          <a:prstGeom prst="rect">
+            <a:avLst/>
+          </a:prstGeom>
+          <a:noFill/>
+        </p:spPr>
+        <p:txBody>
+          <a:bodyPr wrap="square" rtlCol="0">
+            <a:spAutoFit/>
+          </a:bodyPr>
+          <a:lstStyle/>
+          <a:p>
+            <a:r>
+              <a:rPr lang="en-US" b="1" dirty="0" smtClean="0"/>
+              <a:t>t1</a:t>
+            </a:r>
+            <a:endParaRPr lang="en-US" b="1" dirty="0"/>
+          </a:p>
+        </p:txBody>
+      </p:sp>
+      <p:sp>
+        <p:nvSpPr>
+          <p:cNvPr id="22" name="TextBox 21"/>
+          <p:cNvSpPr txBox="1"/>
+          <p:nvPr/>
+        </p:nvSpPr>
+        <p:spPr>
+          <a:xfrm>
+            <a:off x="6551116" y="5410867"/>
+            <a:ext cx="613776" cy="369332"/>
+          </a:xfrm>
+          <a:prstGeom prst="rect">
+            <a:avLst/>
+          </a:prstGeom>
+          <a:noFill/>
+        </p:spPr>
+        <p:txBody>
+          <a:bodyPr wrap="square" rtlCol="0">
+            <a:spAutoFit/>
+          </a:bodyPr>
+          <a:lstStyle/>
+          <a:p>
+            <a:r>
+              <a:rPr lang="en-US" b="1" dirty="0" smtClean="0"/>
+              <a:t>t2</a:t>
+            </a:r>
+            <a:endParaRPr lang="en-US" b="1" dirty="0"/>
+          </a:p>
+        </p:txBody>
+      </p:sp>
+      <p:sp>
+        <p:nvSpPr>
+          <p:cNvPr id="23" name="Rectangle 22"/>
+          <p:cNvSpPr/>
+          <p:nvPr/>
+        </p:nvSpPr>
+        <p:spPr>
+          <a:xfrm>
+            <a:off x="2843407" y="826718"/>
+            <a:ext cx="1302707" cy="520016"/>
+          </a:xfrm>
+          <a:prstGeom prst="rect">
+            <a:avLst/>
+          </a:prstGeom>
+        </p:spPr>
+        <p:style>
+          <a:lnRef idx="2">
+            <a:schemeClr val="accent1">
+              <a:shade val="50000"/>
+            </a:schemeClr>
+          </a:lnRef>
+          <a:fillRef idx="1">
+            <a:schemeClr val="accent1"/>
+          </a:fillRef>
+          <a:effectRef idx="0">
+            <a:schemeClr val="accent1"/>
+          </a:effectRef>
+          <a:fontRef idx="minor">
+            <a:schemeClr val="lt1"/>
+          </a:fontRef>
+        </p:style>
+        <p:txBody>
+          <a:bodyPr rtlCol="0" anchor="ctr"/>
+          <a:lstStyle/>
+          <a:p>
+            <a:pPr algn="ctr"/>
+            <a:r>
+              <a:rPr lang="en-US" b="1" dirty="0" smtClean="0"/>
+              <a:t>OPA test code</a:t>
+            </a:r>
+            <a:endParaRPr lang="en-US" b="1" dirty="0"/>
+          </a:p>
+        </p:txBody>
+      </p:sp>
+      <p:sp>
+        <p:nvSpPr>
+          <p:cNvPr id="24" name="Rectangle 23"/>
+          <p:cNvSpPr/>
+          <p:nvPr/>
+        </p:nvSpPr>
+        <p:spPr>
+          <a:xfrm>
+            <a:off x="4365320" y="833167"/>
+            <a:ext cx="1302707" cy="520016"/>
+          </a:xfrm>
+          <a:prstGeom prst="rect">
+            <a:avLst/>
+          </a:prstGeom>
+          <a:solidFill>
+            <a:schemeClr val="accent6">
+              <a:lumMod val="40000"/>
+              <a:lumOff val="60000"/>
+            </a:schemeClr>
+          </a:solidFill>
+        </p:spPr>
+        <p:style>
+          <a:lnRef idx="2">
+            <a:schemeClr val="accent1">
+              <a:shade val="50000"/>
+            </a:schemeClr>
+          </a:lnRef>
+          <a:fillRef idx="1">
+            <a:schemeClr val="accent1"/>
+          </a:fillRef>
+          <a:effectRef idx="0">
+            <a:schemeClr val="accent1"/>
+          </a:effectRef>
+          <a:fontRef idx="minor">
+            <a:schemeClr val="lt1"/>
+          </a:fontRef>
+        </p:style>
+        <p:txBody>
+          <a:bodyPr rtlCol="0" anchor="ctr"/>
+          <a:lstStyle/>
+          <a:p>
+            <a:pPr algn="ctr"/>
+            <a:r>
+              <a:rPr lang="en-US" b="1" dirty="0" smtClean="0"/>
+              <a:t>My Lead Code</a:t>
+            </a:r>
+            <a:endParaRPr lang="en-US" b="1" dirty="0"/>
+          </a:p>
+        </p:txBody>
+      </p:sp>
+      <p:sp>
+        <p:nvSpPr>
+          <p:cNvPr id="11" name="Oval 10"/>
+          <p:cNvSpPr/>
+          <p:nvPr/>
+        </p:nvSpPr>
+        <p:spPr>
+          <a:xfrm>
+            <a:off x="4659683" y="3970937"/>
+            <a:ext cx="1565754" cy="1302705"/>
+          </a:xfrm>
+          <a:prstGeom prst="ellipse">
+            <a:avLst/>
+          </a:prstGeom>
+          <a:solidFill>
+            <a:schemeClr val="accent4">
+              <a:lumMod val="40000"/>
+              <a:lumOff val="60000"/>
+            </a:schemeClr>
+          </a:solidFill>
+        </p:spPr>
+        <p:style>
+          <a:lnRef idx="2">
+            <a:schemeClr val="accent1">
+              <a:shade val="50000"/>
+            </a:schemeClr>
+          </a:lnRef>
+          <a:fillRef idx="1">
+            <a:schemeClr val="accent1"/>
+          </a:fillRef>
+          <a:effectRef idx="0">
+            <a:schemeClr val="accent1"/>
+          </a:effectRef>
+          <a:fontRef idx="minor">
+            <a:schemeClr val="lt1"/>
+          </a:fontRef>
+        </p:style>
+        <p:txBody>
+          <a:bodyPr rtlCol="0" anchor="ctr"/>
+          <a:lstStyle/>
+          <a:p>
+            <a:pPr algn="ctr"/>
+            <a:r>
+              <a:rPr lang="en-US" altLang="zh-CN" b="1" dirty="0" smtClean="0">
+                <a:solidFill>
+                  <a:srgbClr val="FF0000"/>
+                </a:solidFill>
+              </a:rPr>
+              <a:t>Matcher endless check</a:t>
+            </a:r>
+            <a:endParaRPr lang="en-US" b="1" dirty="0">
+              <a:solidFill>
+                <a:srgbClr val="FF0000"/>
+              </a:solidFill>
+            </a:endParaRPr>
+          </a:p>
+        </p:txBody>
+      </p:sp>
+    </p:spTree>
+    <p:extLst>
+      <p:ext uri="{BB962C8B-B14F-4D97-AF65-F5344CB8AC3E}">
+        <p14:creationId xmlns:p14="http://schemas.microsoft.com/office/powerpoint/2010/main" val="4282332857"/>
       </p:ext>
     </p:extLst>
   </p:cSld>

</xml_diff>

<commit_message>
something wrong with ear
</commit_message>
<xml_diff>
--- a/Jerry.pptx
+++ b/Jerry.pptx
@@ -5,7 +5,7 @@
     <p:sldMasterId id="2147483648" r:id="rId1"/>
   </p:sldMasterIdLst>
   <p:notesMasterIdLst>
-    <p:notesMasterId r:id="rId31"/>
+    <p:notesMasterId r:id="rId32"/>
   </p:notesMasterIdLst>
   <p:sldIdLst>
     <p:sldId id="257" r:id="rId2"/>
@@ -37,6 +37,7 @@
     <p:sldId id="287" r:id="rId28"/>
     <p:sldId id="288" r:id="rId29"/>
     <p:sldId id="289" r:id="rId30"/>
+    <p:sldId id="290" r:id="rId31"/>
   </p:sldIdLst>
   <p:sldSz cx="12192000" cy="6858000"/>
   <p:notesSz cx="6858000" cy="9144000"/>
@@ -225,7 +226,7 @@
           <a:p>
             <a:fld id="{C1FFF932-AE32-4CB2-A004-ABC55BBBB993}" type="datetimeFigureOut">
               <a:rPr lang="en-US" smtClean="0"/>
-              <a:t>2016-07-06</a:t>
+              <a:t>2016-07-20</a:t>
             </a:fld>
             <a:endParaRPr lang="en-US"/>
           </a:p>
@@ -2262,7 +2263,7 @@
           <a:p>
             <a:fld id="{32885C6E-53D4-4DF2-B9C6-C242624B2A8A}" type="datetimeFigureOut">
               <a:rPr lang="en-US" smtClean="0"/>
-              <a:t>2016-07-06</a:t>
+              <a:t>2016-07-20</a:t>
             </a:fld>
             <a:endParaRPr lang="en-US"/>
           </a:p>
@@ -2432,7 +2433,7 @@
           <a:p>
             <a:fld id="{32885C6E-53D4-4DF2-B9C6-C242624B2A8A}" type="datetimeFigureOut">
               <a:rPr lang="en-US" smtClean="0"/>
-              <a:t>2016-07-06</a:t>
+              <a:t>2016-07-20</a:t>
             </a:fld>
             <a:endParaRPr lang="en-US"/>
           </a:p>
@@ -2612,7 +2613,7 @@
           <a:p>
             <a:fld id="{32885C6E-53D4-4DF2-B9C6-C242624B2A8A}" type="datetimeFigureOut">
               <a:rPr lang="en-US" smtClean="0"/>
-              <a:t>2016-07-06</a:t>
+              <a:t>2016-07-20</a:t>
             </a:fld>
             <a:endParaRPr lang="en-US"/>
           </a:p>
@@ -2782,7 +2783,7 @@
           <a:p>
             <a:fld id="{32885C6E-53D4-4DF2-B9C6-C242624B2A8A}" type="datetimeFigureOut">
               <a:rPr lang="en-US" smtClean="0"/>
-              <a:t>2016-07-06</a:t>
+              <a:t>2016-07-20</a:t>
             </a:fld>
             <a:endParaRPr lang="en-US"/>
           </a:p>
@@ -3028,7 +3029,7 @@
           <a:p>
             <a:fld id="{32885C6E-53D4-4DF2-B9C6-C242624B2A8A}" type="datetimeFigureOut">
               <a:rPr lang="en-US" smtClean="0"/>
-              <a:t>2016-07-06</a:t>
+              <a:t>2016-07-20</a:t>
             </a:fld>
             <a:endParaRPr lang="en-US"/>
           </a:p>
@@ -3260,7 +3261,7 @@
           <a:p>
             <a:fld id="{32885C6E-53D4-4DF2-B9C6-C242624B2A8A}" type="datetimeFigureOut">
               <a:rPr lang="en-US" smtClean="0"/>
-              <a:t>2016-07-06</a:t>
+              <a:t>2016-07-20</a:t>
             </a:fld>
             <a:endParaRPr lang="en-US"/>
           </a:p>
@@ -3627,7 +3628,7 @@
           <a:p>
             <a:fld id="{32885C6E-53D4-4DF2-B9C6-C242624B2A8A}" type="datetimeFigureOut">
               <a:rPr lang="en-US" smtClean="0"/>
-              <a:t>2016-07-06</a:t>
+              <a:t>2016-07-20</a:t>
             </a:fld>
             <a:endParaRPr lang="en-US"/>
           </a:p>
@@ -3745,7 +3746,7 @@
           <a:p>
             <a:fld id="{32885C6E-53D4-4DF2-B9C6-C242624B2A8A}" type="datetimeFigureOut">
               <a:rPr lang="en-US" smtClean="0"/>
-              <a:t>2016-07-06</a:t>
+              <a:t>2016-07-20</a:t>
             </a:fld>
             <a:endParaRPr lang="en-US"/>
           </a:p>
@@ -3840,7 +3841,7 @@
           <a:p>
             <a:fld id="{32885C6E-53D4-4DF2-B9C6-C242624B2A8A}" type="datetimeFigureOut">
               <a:rPr lang="en-US" smtClean="0"/>
-              <a:t>2016-07-06</a:t>
+              <a:t>2016-07-20</a:t>
             </a:fld>
             <a:endParaRPr lang="en-US"/>
           </a:p>
@@ -4117,7 +4118,7 @@
           <a:p>
             <a:fld id="{32885C6E-53D4-4DF2-B9C6-C242624B2A8A}" type="datetimeFigureOut">
               <a:rPr lang="en-US" smtClean="0"/>
-              <a:t>2016-07-06</a:t>
+              <a:t>2016-07-20</a:t>
             </a:fld>
             <a:endParaRPr lang="en-US"/>
           </a:p>
@@ -4370,7 +4371,7 @@
           <a:p>
             <a:fld id="{32885C6E-53D4-4DF2-B9C6-C242624B2A8A}" type="datetimeFigureOut">
               <a:rPr lang="en-US" smtClean="0"/>
-              <a:t>2016-07-06</a:t>
+              <a:t>2016-07-20</a:t>
             </a:fld>
             <a:endParaRPr lang="en-US"/>
           </a:p>
@@ -4583,7 +4584,7 @@
           <a:p>
             <a:fld id="{32885C6E-53D4-4DF2-B9C6-C242624B2A8A}" type="datetimeFigureOut">
               <a:rPr lang="en-US" smtClean="0"/>
-              <a:t>2016-07-06</a:t>
+              <a:t>2016-07-20</a:t>
             </a:fld>
             <a:endParaRPr lang="en-US"/>
           </a:p>
@@ -15404,7 +15405,6 @@
               <a:rPr lang="en-US" sz="1400" dirty="0"/>
               <a:t>("f");</a:t>
             </a:r>
-            <a:endParaRPr lang="en-US" sz="1400" dirty="0"/>
           </a:p>
         </p:txBody>
       </p:sp>
@@ -15470,7 +15470,6 @@
               <a:rPr lang="en-US" sz="1400" dirty="0"/>
               <a:t>, null, true)</a:t>
             </a:r>
-            <a:endParaRPr lang="en-US" sz="1400" dirty="0"/>
           </a:p>
         </p:txBody>
       </p:sp>
@@ -16062,7 +16061,6 @@
               <a:rPr lang="en-US" sz="1400" dirty="0"/>
               <a:t>("f");</a:t>
             </a:r>
-            <a:endParaRPr lang="en-US" sz="1400" dirty="0"/>
           </a:p>
         </p:txBody>
       </p:sp>
@@ -16128,7 +16126,6 @@
               <a:rPr lang="en-US" sz="1400" dirty="0"/>
               <a:t>, null, true)</a:t>
             </a:r>
-            <a:endParaRPr lang="en-US" sz="1400" dirty="0"/>
           </a:p>
         </p:txBody>
       </p:sp>
@@ -17051,6 +17048,110 @@
     <p:extLst>
       <p:ext uri="{BB962C8B-B14F-4D97-AF65-F5344CB8AC3E}">
         <p14:creationId xmlns:p14="http://schemas.microsoft.com/office/powerpoint/2010/main" val="1848839220"/>
+      </p:ext>
+    </p:extLst>
+  </p:cSld>
+  <p:clrMapOvr>
+    <a:masterClrMapping/>
+  </p:clrMapOvr>
+  <p:timing>
+    <p:tnLst>
+      <p:par>
+        <p:cTn id="1" dur="indefinite" restart="never" nodeType="tmRoot"/>
+      </p:par>
+    </p:tnLst>
+  </p:timing>
+</p:sld>
+</file>
+
+<file path=ppt/slides/slide30.xml><?xml version="1.0" encoding="utf-8"?>
+<p:sld xmlns:a="http://schemas.openxmlformats.org/drawingml/2006/main" xmlns:r="http://schemas.openxmlformats.org/officeDocument/2006/relationships" xmlns:p="http://schemas.openxmlformats.org/presentationml/2006/main">
+  <p:cSld>
+    <p:spTree>
+      <p:nvGrpSpPr>
+        <p:cNvPr id="1" name=""/>
+        <p:cNvGrpSpPr/>
+        <p:nvPr/>
+      </p:nvGrpSpPr>
+      <p:grpSpPr>
+        <a:xfrm>
+          <a:off x="0" y="0"/>
+          <a:ext cx="0" cy="0"/>
+          <a:chOff x="0" y="0"/>
+          <a:chExt cx="0" cy="0"/>
+        </a:xfrm>
+      </p:grpSpPr>
+      <p:sp>
+        <p:nvSpPr>
+          <p:cNvPr id="2" name="Title 1"/>
+          <p:cNvSpPr>
+            <a:spLocks noGrp="1"/>
+          </p:cNvSpPr>
+          <p:nvPr>
+            <p:ph type="title"/>
+          </p:nvPr>
+        </p:nvSpPr>
+        <p:spPr/>
+        <p:txBody>
+          <a:bodyPr/>
+          <a:lstStyle/>
+          <a:p>
+            <a:endParaRPr lang="en-US"/>
+          </a:p>
+        </p:txBody>
+      </p:sp>
+      <p:pic>
+        <p:nvPicPr>
+          <p:cNvPr id="3" name="Picture 2"/>
+          <p:cNvPicPr>
+            <a:picLocks noChangeAspect="1"/>
+          </p:cNvPicPr>
+          <p:nvPr/>
+        </p:nvPicPr>
+        <p:blipFill>
+          <a:blip r:embed="rId2"/>
+          <a:stretch>
+            <a:fillRect/>
+          </a:stretch>
+        </p:blipFill>
+        <p:spPr>
+          <a:xfrm>
+            <a:off x="504224" y="1822874"/>
+            <a:ext cx="9655377" cy="1859441"/>
+          </a:xfrm>
+          <a:prstGeom prst="rect">
+            <a:avLst/>
+          </a:prstGeom>
+        </p:spPr>
+      </p:pic>
+      <p:pic>
+        <p:nvPicPr>
+          <p:cNvPr id="4" name="Picture 3"/>
+          <p:cNvPicPr>
+            <a:picLocks noChangeAspect="1"/>
+          </p:cNvPicPr>
+          <p:nvPr/>
+        </p:nvPicPr>
+        <p:blipFill>
+          <a:blip r:embed="rId3"/>
+          <a:stretch>
+            <a:fillRect/>
+          </a:stretch>
+        </p:blipFill>
+        <p:spPr>
+          <a:xfrm>
+            <a:off x="5127648" y="2430396"/>
+            <a:ext cx="7064352" cy="4427604"/>
+          </a:xfrm>
+          <a:prstGeom prst="rect">
+            <a:avLst/>
+          </a:prstGeom>
+        </p:spPr>
+      </p:pic>
+    </p:spTree>
+    <p:extLst>
+      <p:ext uri="{BB962C8B-B14F-4D97-AF65-F5344CB8AC3E}">
+        <p14:creationId xmlns:p14="http://schemas.microsoft.com/office/powerpoint/2010/main" val="1243536137"/>
       </p:ext>
     </p:extLst>
   </p:cSld>

</xml_diff>